<commit_message>
CMap added, needs to be parsed in Step3
</commit_message>
<xml_diff>
--- a/Notebooks/patients/ICB1572/ICB1572.mtb_slides.pptx
+++ b/Notebooks/patients/ICB1572/ICB1572.mtb_slides.pptx
@@ -7,6 +7,9 @@
   <p:sldIdLst>
     <p:sldId id="256" r:id="rId7"/>
     <p:sldId id="257" r:id="rId8"/>
+    <p:sldId id="258" r:id="rId9"/>
+    <p:sldId id="259" r:id="rId10"/>
+    <p:sldId id="260" r:id="rId11"/>
   </p:sldIdLst>
   <p:sldSz cx="9144000" cy="6858000" type="screen4x3"/>
   <p:notesSz cx="6858000" cy="9144000"/>
@@ -5509,6 +5512,4441 @@
                       </a:pPr>
                       <a:r>
                         <a:t>Not Clinically Relevant</a:t>
+                      </a:r>
+                    </a:p>
+                  </a:txBody>
+                  <a:tcPr/>
+                </a:tc>
+              </a:tr>
+            </a:tbl>
+          </a:graphicData>
+        </a:graphic>
+      </p:graphicFrame>
+    </p:spTree>
+  </p:cSld>
+  <p:clrMapOvr>
+    <a:masterClrMapping/>
+  </p:clrMapOvr>
+</p:sld>
+</file>
+
+<file path=ppt/slides/slide3.xml><?xml version="1.0" encoding="utf-8"?>
+<p:sld xmlns:a="http://schemas.openxmlformats.org/drawingml/2006/main" xmlns:p="http://schemas.openxmlformats.org/presentationml/2006/main" xmlns:r="http://schemas.openxmlformats.org/officeDocument/2006/relationships">
+  <p:cSld>
+    <p:spTree>
+      <p:nvGrpSpPr>
+        <p:cNvPr id="1" name=""/>
+        <p:cNvGrpSpPr/>
+        <p:nvPr/>
+      </p:nvGrpSpPr>
+      <p:grpSpPr/>
+      <p:sp>
+        <p:nvSpPr>
+          <p:cNvPr id="2" name="TextBox 1"/>
+          <p:cNvSpPr txBox="1"/>
+          <p:nvPr/>
+        </p:nvSpPr>
+        <p:spPr>
+          <a:xfrm>
+            <a:off x="0" y="0"/>
+            <a:ext cx="9144000" cy="685800"/>
+          </a:xfrm>
+          <a:prstGeom prst="rect">
+            <a:avLst/>
+          </a:prstGeom>
+          <a:noFill/>
+        </p:spPr>
+        <p:txBody>
+          <a:bodyPr wrap="none">
+            <a:spAutoFit/>
+          </a:bodyPr>
+          <a:lstStyle/>
+          <a:p/>
+          <a:p>
+            <a:pPr>
+              <a:defRPr sz="2600"/>
+            </a:pPr>
+            <a:r>
+              <a:t>DiSCoVER: top drugs (cerebellar stem cell control)</a:t>
+            </a:r>
+          </a:p>
+        </p:txBody>
+      </p:sp>
+      <p:graphicFrame>
+        <p:nvGraphicFramePr>
+          <p:cNvPr id="3" name="Table 2"/>
+          <p:cNvGraphicFramePr>
+            <a:graphicFrameLocks noGrp="1"/>
+          </p:cNvGraphicFramePr>
+          <p:nvPr/>
+        </p:nvGraphicFramePr>
+        <p:xfrm>
+          <a:off x="411480" y="777240"/>
+          <a:ext cx="8275320" cy="4114800"/>
+        </p:xfrm>
+        <a:graphic>
+          <a:graphicData uri="http://schemas.openxmlformats.org/drawingml/2006/table">
+            <a:tbl>
+              <a:tblPr firstRow="1" bandRow="1">
+                <a:tableStyleId>{5C22544A-7EE6-4342-B048-85BDC9FD1C3A}</a:tableStyleId>
+              </a:tblPr>
+              <a:tblGrid>
+                <a:gridCol w="1005840"/>
+                <a:gridCol w="731520"/>
+                <a:gridCol w="1051560"/>
+                <a:gridCol w="5486400"/>
+              </a:tblGrid>
+              <a:tr h="195942">
+                <a:tc>
+                  <a:txBody>
+                    <a:bodyPr/>
+                    <a:lstStyle/>
+                    <a:p>
+                      <a:r>
+                        <a:t>Drug</a:t>
+                      </a:r>
+                    </a:p>
+                  </a:txBody>
+                  <a:tcPr/>
+                </a:tc>
+                <a:tc>
+                  <a:txBody>
+                    <a:bodyPr/>
+                    <a:lstStyle/>
+                    <a:p>
+                      <a:r>
+                        <a:t>Score</a:t>
+                      </a:r>
+                    </a:p>
+                  </a:txBody>
+                  <a:tcPr/>
+                </a:tc>
+                <a:tc>
+                  <a:txBody>
+                    <a:bodyPr/>
+                    <a:lstStyle/>
+                    <a:p>
+                      <a:r>
+                        <a:t>Evidence</a:t>
+                      </a:r>
+                    </a:p>
+                  </a:txBody>
+                  <a:tcPr/>
+                </a:tc>
+                <a:tc>
+                  <a:txBody>
+                    <a:bodyPr/>
+                    <a:lstStyle/>
+                    <a:p>
+                      <a:r>
+                        <a:t>Mechanism of action</a:t>
+                      </a:r>
+                    </a:p>
+                  </a:txBody>
+                  <a:tcPr/>
+                </a:tc>
+              </a:tr>
+              <a:tr h="195942">
+                <a:tc>
+                  <a:txBody>
+                    <a:bodyPr/>
+                    <a:lstStyle/>
+                    <a:p>
+                      <a:pPr>
+                        <a:defRPr sz="1050"/>
+                      </a:pPr>
+                      <a:r>
+                        <a:t>gsk1070916</a:t>
+                      </a:r>
+                    </a:p>
+                  </a:txBody>
+                  <a:tcPr/>
+                </a:tc>
+                <a:tc>
+                  <a:txBody>
+                    <a:bodyPr/>
+                    <a:lstStyle/>
+                    <a:p>
+                      <a:pPr>
+                        <a:defRPr sz="1050"/>
+                      </a:pPr>
+                      <a:r>
+                        <a:t>0.63</a:t>
+                      </a:r>
+                    </a:p>
+                  </a:txBody>
+                  <a:tcPr/>
+                </a:tc>
+                <a:tc>
+                  <a:txBody>
+                    <a:bodyPr/>
+                    <a:lstStyle/>
+                    <a:p>
+                      <a:pPr>
+                        <a:defRPr sz="1050"/>
+                      </a:pPr>
+                      <a:r>
+                        <a:t>+..</a:t>
+                      </a:r>
+                    </a:p>
+                  </a:txBody>
+                  <a:tcPr/>
+                </a:tc>
+                <a:tc>
+                  <a:txBody>
+                    <a:bodyPr/>
+                    <a:lstStyle/>
+                    <a:p>
+                      <a:pPr>
+                        <a:defRPr sz="1050"/>
+                      </a:pPr>
+                      <a:r>
+                        <a:t>Not Clinically Relevant</a:t>
+                      </a:r>
+                    </a:p>
+                  </a:txBody>
+                  <a:tcPr/>
+                </a:tc>
+              </a:tr>
+              <a:tr h="195942">
+                <a:tc>
+                  <a:txBody>
+                    <a:bodyPr/>
+                    <a:lstStyle/>
+                    <a:p>
+                      <a:pPr>
+                        <a:defRPr sz="1050"/>
+                      </a:pPr>
+                      <a:r>
+                        <a:t>ql-xii-61</a:t>
+                      </a:r>
+                    </a:p>
+                  </a:txBody>
+                  <a:tcPr/>
+                </a:tc>
+                <a:tc>
+                  <a:txBody>
+                    <a:bodyPr/>
+                    <a:lstStyle/>
+                    <a:p>
+                      <a:pPr>
+                        <a:defRPr sz="1050"/>
+                      </a:pPr>
+                      <a:r>
+                        <a:t>0.57</a:t>
+                      </a:r>
+                    </a:p>
+                  </a:txBody>
+                  <a:tcPr/>
+                </a:tc>
+                <a:tc>
+                  <a:txBody>
+                    <a:bodyPr/>
+                    <a:lstStyle/>
+                    <a:p>
+                      <a:pPr>
+                        <a:defRPr sz="1050"/>
+                      </a:pPr>
+                      <a:r>
+                        <a:t>+..</a:t>
+                      </a:r>
+                    </a:p>
+                  </a:txBody>
+                  <a:tcPr/>
+                </a:tc>
+                <a:tc>
+                  <a:txBody>
+                    <a:bodyPr/>
+                    <a:lstStyle/>
+                    <a:p>
+                      <a:pPr>
+                        <a:defRPr sz="1050"/>
+                      </a:pPr>
+                      <a:r>
+                        <a:t>Not Clinically Relevant</a:t>
+                      </a:r>
+                    </a:p>
+                  </a:txBody>
+                  <a:tcPr/>
+                </a:tc>
+              </a:tr>
+              <a:tr h="195942">
+                <a:tc>
+                  <a:txBody>
+                    <a:bodyPr/>
+                    <a:lstStyle/>
+                    <a:p>
+                      <a:pPr>
+                        <a:defRPr sz="1050"/>
+                      </a:pPr>
+                      <a:r>
+                        <a:t>sb52334</a:t>
+                      </a:r>
+                    </a:p>
+                  </a:txBody>
+                  <a:tcPr/>
+                </a:tc>
+                <a:tc>
+                  <a:txBody>
+                    <a:bodyPr/>
+                    <a:lstStyle/>
+                    <a:p>
+                      <a:pPr>
+                        <a:defRPr sz="1050"/>
+                      </a:pPr>
+                      <a:r>
+                        <a:t>0.56</a:t>
+                      </a:r>
+                    </a:p>
+                  </a:txBody>
+                  <a:tcPr/>
+                </a:tc>
+                <a:tc>
+                  <a:txBody>
+                    <a:bodyPr/>
+                    <a:lstStyle/>
+                    <a:p>
+                      <a:pPr>
+                        <a:defRPr sz="1050"/>
+                      </a:pPr>
+                      <a:r>
+                        <a:t>+..</a:t>
+                      </a:r>
+                    </a:p>
+                  </a:txBody>
+                  <a:tcPr/>
+                </a:tc>
+                <a:tc>
+                  <a:txBody>
+                    <a:bodyPr/>
+                    <a:lstStyle/>
+                    <a:p>
+                      <a:pPr>
+                        <a:defRPr sz="1050"/>
+                      </a:pPr>
+                      <a:r>
+                        <a:t>Not Clinically Relevant</a:t>
+                      </a:r>
+                    </a:p>
+                  </a:txBody>
+                  <a:tcPr/>
+                </a:tc>
+              </a:tr>
+              <a:tr h="195942">
+                <a:tc>
+                  <a:txBody>
+                    <a:bodyPr/>
+                    <a:lstStyle/>
+                    <a:p>
+                      <a:pPr>
+                        <a:defRPr sz="1050"/>
+                      </a:pPr>
+                      <a:r>
+                        <a:t>gsk429286a</a:t>
+                      </a:r>
+                    </a:p>
+                  </a:txBody>
+                  <a:tcPr/>
+                </a:tc>
+                <a:tc>
+                  <a:txBody>
+                    <a:bodyPr/>
+                    <a:lstStyle/>
+                    <a:p>
+                      <a:pPr>
+                        <a:defRPr sz="1050"/>
+                      </a:pPr>
+                      <a:r>
+                        <a:t>0.56</a:t>
+                      </a:r>
+                    </a:p>
+                  </a:txBody>
+                  <a:tcPr/>
+                </a:tc>
+                <a:tc>
+                  <a:txBody>
+                    <a:bodyPr/>
+                    <a:lstStyle/>
+                    <a:p>
+                      <a:pPr>
+                        <a:defRPr sz="1050"/>
+                      </a:pPr>
+                      <a:r>
+                        <a:t>+..</a:t>
+                      </a:r>
+                    </a:p>
+                  </a:txBody>
+                  <a:tcPr/>
+                </a:tc>
+                <a:tc>
+                  <a:txBody>
+                    <a:bodyPr/>
+                    <a:lstStyle/>
+                    <a:p>
+                      <a:pPr>
+                        <a:defRPr sz="1050"/>
+                      </a:pPr>
+                      <a:r>
+                        <a:t>Not Clinically Relevant</a:t>
+                      </a:r>
+                    </a:p>
+                  </a:txBody>
+                  <a:tcPr/>
+                </a:tc>
+              </a:tr>
+              <a:tr h="195942">
+                <a:tc>
+                  <a:txBody>
+                    <a:bodyPr/>
+                    <a:lstStyle/>
+                    <a:p>
+                      <a:pPr>
+                        <a:defRPr sz="1050"/>
+                      </a:pPr>
+                      <a:r>
+                        <a:t>vx-702</a:t>
+                      </a:r>
+                    </a:p>
+                  </a:txBody>
+                  <a:tcPr/>
+                </a:tc>
+                <a:tc>
+                  <a:txBody>
+                    <a:bodyPr/>
+                    <a:lstStyle/>
+                    <a:p>
+                      <a:pPr>
+                        <a:defRPr sz="1050"/>
+                      </a:pPr>
+                      <a:r>
+                        <a:t>0.55</a:t>
+                      </a:r>
+                    </a:p>
+                  </a:txBody>
+                  <a:tcPr/>
+                </a:tc>
+                <a:tc>
+                  <a:txBody>
+                    <a:bodyPr/>
+                    <a:lstStyle/>
+                    <a:p>
+                      <a:pPr>
+                        <a:defRPr sz="1050"/>
+                      </a:pPr>
+                      <a:r>
+                        <a:t>+..</a:t>
+                      </a:r>
+                    </a:p>
+                  </a:txBody>
+                  <a:tcPr/>
+                </a:tc>
+                <a:tc>
+                  <a:txBody>
+                    <a:bodyPr/>
+                    <a:lstStyle/>
+                    <a:p>
+                      <a:pPr>
+                        <a:defRPr sz="1050"/>
+                      </a:pPr>
+                      <a:r>
+                        <a:t>Not Clinically Relevant</a:t>
+                      </a:r>
+                    </a:p>
+                  </a:txBody>
+                  <a:tcPr/>
+                </a:tc>
+              </a:tr>
+              <a:tr h="195942">
+                <a:tc>
+                  <a:txBody>
+                    <a:bodyPr/>
+                    <a:lstStyle/>
+                    <a:p>
+                      <a:pPr>
+                        <a:defRPr sz="1050"/>
+                      </a:pPr>
+                      <a:r>
+                        <a:t>tl-2-105</a:t>
+                      </a:r>
+                    </a:p>
+                  </a:txBody>
+                  <a:tcPr/>
+                </a:tc>
+                <a:tc>
+                  <a:txBody>
+                    <a:bodyPr/>
+                    <a:lstStyle/>
+                    <a:p>
+                      <a:pPr>
+                        <a:defRPr sz="1050"/>
+                      </a:pPr>
+                      <a:r>
+                        <a:t>0.55</a:t>
+                      </a:r>
+                    </a:p>
+                  </a:txBody>
+                  <a:tcPr/>
+                </a:tc>
+                <a:tc>
+                  <a:txBody>
+                    <a:bodyPr/>
+                    <a:lstStyle/>
+                    <a:p>
+                      <a:pPr>
+                        <a:defRPr sz="1050"/>
+                      </a:pPr>
+                      <a:r>
+                        <a:t>+..</a:t>
+                      </a:r>
+                    </a:p>
+                  </a:txBody>
+                  <a:tcPr/>
+                </a:tc>
+                <a:tc>
+                  <a:txBody>
+                    <a:bodyPr/>
+                    <a:lstStyle/>
+                    <a:p>
+                      <a:pPr>
+                        <a:defRPr sz="1050"/>
+                      </a:pPr>
+                      <a:r>
+                        <a:t>Not Clinically Relevant</a:t>
+                      </a:r>
+                    </a:p>
+                  </a:txBody>
+                  <a:tcPr/>
+                </a:tc>
+              </a:tr>
+              <a:tr h="195942">
+                <a:tc>
+                  <a:txBody>
+                    <a:bodyPr/>
+                    <a:lstStyle/>
+                    <a:p>
+                      <a:pPr>
+                        <a:defRPr sz="1050"/>
+                      </a:pPr>
+                      <a:r>
+                        <a:t>gw-2580</a:t>
+                      </a:r>
+                    </a:p>
+                  </a:txBody>
+                  <a:tcPr/>
+                </a:tc>
+                <a:tc>
+                  <a:txBody>
+                    <a:bodyPr/>
+                    <a:lstStyle/>
+                    <a:p>
+                      <a:pPr>
+                        <a:defRPr sz="1050"/>
+                      </a:pPr>
+                      <a:r>
+                        <a:t>0.55</a:t>
+                      </a:r>
+                    </a:p>
+                  </a:txBody>
+                  <a:tcPr/>
+                </a:tc>
+                <a:tc>
+                  <a:txBody>
+                    <a:bodyPr/>
+                    <a:lstStyle/>
+                    <a:p>
+                      <a:pPr>
+                        <a:defRPr sz="1050"/>
+                      </a:pPr>
+                      <a:r>
+                        <a:t>+..</a:t>
+                      </a:r>
+                    </a:p>
+                  </a:txBody>
+                  <a:tcPr/>
+                </a:tc>
+                <a:tc>
+                  <a:txBody>
+                    <a:bodyPr/>
+                    <a:lstStyle/>
+                    <a:p>
+                      <a:pPr>
+                        <a:defRPr sz="1050"/>
+                      </a:pPr>
+                      <a:r>
+                        <a:t>Not Clinically Relevant</a:t>
+                      </a:r>
+                    </a:p>
+                  </a:txBody>
+                  <a:tcPr/>
+                </a:tc>
+              </a:tr>
+              <a:tr h="195942">
+                <a:tc>
+                  <a:txBody>
+                    <a:bodyPr/>
+                    <a:lstStyle/>
+                    <a:p>
+                      <a:pPr>
+                        <a:defRPr sz="1050"/>
+                      </a:pPr>
+                      <a:r>
+                        <a:t>linsitinib</a:t>
+                      </a:r>
+                    </a:p>
+                  </a:txBody>
+                  <a:tcPr/>
+                </a:tc>
+                <a:tc>
+                  <a:txBody>
+                    <a:bodyPr/>
+                    <a:lstStyle/>
+                    <a:p>
+                      <a:pPr>
+                        <a:defRPr sz="1050"/>
+                      </a:pPr>
+                      <a:r>
+                        <a:t>0.53</a:t>
+                      </a:r>
+                    </a:p>
+                  </a:txBody>
+                  <a:tcPr/>
+                </a:tc>
+                <a:tc>
+                  <a:txBody>
+                    <a:bodyPr/>
+                    <a:lstStyle/>
+                    <a:p>
+                      <a:pPr>
+                        <a:defRPr sz="1050"/>
+                      </a:pPr>
+                      <a:r>
+                        <a:t>++.</a:t>
+                      </a:r>
+                    </a:p>
+                  </a:txBody>
+                  <a:tcPr/>
+                </a:tc>
+                <a:tc>
+                  <a:txBody>
+                    <a:bodyPr/>
+                    <a:lstStyle/>
+                    <a:p>
+                      <a:pPr>
+                        <a:defRPr sz="1050"/>
+                      </a:pPr>
+                      <a:r>
+                        <a:t>IGF-1R inhibitor</a:t>
+                      </a:r>
+                    </a:p>
+                  </a:txBody>
+                  <a:tcPr/>
+                </a:tc>
+              </a:tr>
+              <a:tr h="195942">
+                <a:tc>
+                  <a:txBody>
+                    <a:bodyPr/>
+                    <a:lstStyle/>
+                    <a:p>
+                      <a:pPr>
+                        <a:defRPr sz="1050"/>
+                      </a:pPr>
+                      <a:r>
+                        <a:t>tubastatin a</a:t>
+                      </a:r>
+                    </a:p>
+                  </a:txBody>
+                  <a:tcPr/>
+                </a:tc>
+                <a:tc>
+                  <a:txBody>
+                    <a:bodyPr/>
+                    <a:lstStyle/>
+                    <a:p>
+                      <a:pPr>
+                        <a:defRPr sz="1050"/>
+                      </a:pPr>
+                      <a:r>
+                        <a:t>0.52</a:t>
+                      </a:r>
+                    </a:p>
+                  </a:txBody>
+                  <a:tcPr/>
+                </a:tc>
+                <a:tc>
+                  <a:txBody>
+                    <a:bodyPr/>
+                    <a:lstStyle/>
+                    <a:p>
+                      <a:pPr>
+                        <a:defRPr sz="1050"/>
+                      </a:pPr>
+                      <a:r>
+                        <a:t>++.</a:t>
+                      </a:r>
+                    </a:p>
+                  </a:txBody>
+                  <a:tcPr/>
+                </a:tc>
+                <a:tc>
+                  <a:txBody>
+                    <a:bodyPr/>
+                    <a:lstStyle/>
+                    <a:p>
+                      <a:pPr>
+                        <a:defRPr sz="1050"/>
+                      </a:pPr>
+                      <a:r>
+                        <a:t>Not Clinically Relevant</a:t>
+                      </a:r>
+                    </a:p>
+                  </a:txBody>
+                  <a:tcPr/>
+                </a:tc>
+              </a:tr>
+              <a:tr h="195942">
+                <a:tc>
+                  <a:txBody>
+                    <a:bodyPr/>
+                    <a:lstStyle/>
+                    <a:p>
+                      <a:pPr>
+                        <a:defRPr sz="1050"/>
+                      </a:pPr>
+                      <a:r>
+                        <a:t>bx-912</a:t>
+                      </a:r>
+                    </a:p>
+                  </a:txBody>
+                  <a:tcPr/>
+                </a:tc>
+                <a:tc>
+                  <a:txBody>
+                    <a:bodyPr/>
+                    <a:lstStyle/>
+                    <a:p>
+                      <a:pPr>
+                        <a:defRPr sz="1050"/>
+                      </a:pPr>
+                      <a:r>
+                        <a:t>0.5</a:t>
+                      </a:r>
+                    </a:p>
+                  </a:txBody>
+                  <a:tcPr/>
+                </a:tc>
+                <a:tc>
+                  <a:txBody>
+                    <a:bodyPr/>
+                    <a:lstStyle/>
+                    <a:p>
+                      <a:pPr>
+                        <a:defRPr sz="1050"/>
+                      </a:pPr>
+                      <a:r>
+                        <a:t>+..</a:t>
+                      </a:r>
+                    </a:p>
+                  </a:txBody>
+                  <a:tcPr/>
+                </a:tc>
+                <a:tc>
+                  <a:txBody>
+                    <a:bodyPr/>
+                    <a:lstStyle/>
+                    <a:p>
+                      <a:pPr>
+                        <a:defRPr sz="1050"/>
+                      </a:pPr>
+                      <a:r>
+                        <a:t>Not Clinically Relevant</a:t>
+                      </a:r>
+                    </a:p>
+                  </a:txBody>
+                  <a:tcPr/>
+                </a:tc>
+              </a:tr>
+              <a:tr h="195942">
+                <a:tc>
+                  <a:txBody>
+                    <a:bodyPr/>
+                    <a:lstStyle/>
+                    <a:p>
+                      <a:pPr>
+                        <a:defRPr sz="1050"/>
+                      </a:pPr>
+                      <a:r>
+                        <a:t>navitoclax</a:t>
+                      </a:r>
+                    </a:p>
+                  </a:txBody>
+                  <a:tcPr/>
+                </a:tc>
+                <a:tc>
+                  <a:txBody>
+                    <a:bodyPr/>
+                    <a:lstStyle/>
+                    <a:p>
+                      <a:pPr>
+                        <a:defRPr sz="1050"/>
+                      </a:pPr>
+                      <a:r>
+                        <a:t>0.49</a:t>
+                      </a:r>
+                    </a:p>
+                  </a:txBody>
+                  <a:tcPr/>
+                </a:tc>
+                <a:tc>
+                  <a:txBody>
+                    <a:bodyPr/>
+                    <a:lstStyle/>
+                    <a:p>
+                      <a:pPr>
+                        <a:defRPr sz="1050"/>
+                      </a:pPr>
+                      <a:r>
+                        <a:t>++.</a:t>
+                      </a:r>
+                    </a:p>
+                  </a:txBody>
+                  <a:tcPr/>
+                </a:tc>
+                <a:tc>
+                  <a:txBody>
+                    <a:bodyPr/>
+                    <a:lstStyle/>
+                    <a:p>
+                      <a:pPr>
+                        <a:defRPr sz="1050"/>
+                      </a:pPr>
+                      <a:r>
+                        <a:t>Bcl-2 family inhibitor: esp Bcl-xL, Bcl-2 and Bcl-w</a:t>
+                      </a:r>
+                    </a:p>
+                  </a:txBody>
+                  <a:tcPr/>
+                </a:tc>
+              </a:tr>
+              <a:tr h="195942">
+                <a:tc>
+                  <a:txBody>
+                    <a:bodyPr/>
+                    <a:lstStyle/>
+                    <a:p>
+                      <a:pPr>
+                        <a:defRPr sz="1050"/>
+                      </a:pPr>
+                      <a:r>
+                        <a:t>tretinoin</a:t>
+                      </a:r>
+                    </a:p>
+                  </a:txBody>
+                  <a:tcPr/>
+                </a:tc>
+                <a:tc>
+                  <a:txBody>
+                    <a:bodyPr/>
+                    <a:lstStyle/>
+                    <a:p>
+                      <a:pPr>
+                        <a:defRPr sz="1050"/>
+                      </a:pPr>
+                      <a:r>
+                        <a:t>0.48</a:t>
+                      </a:r>
+                    </a:p>
+                  </a:txBody>
+                  <a:tcPr/>
+                </a:tc>
+                <a:tc>
+                  <a:txBody>
+                    <a:bodyPr/>
+                    <a:lstStyle/>
+                    <a:p>
+                      <a:pPr>
+                        <a:defRPr sz="1050"/>
+                      </a:pPr>
+                      <a:r>
+                        <a:t>++.</a:t>
+                      </a:r>
+                    </a:p>
+                  </a:txBody>
+                  <a:tcPr/>
+                </a:tc>
+                <a:tc>
+                  <a:txBody>
+                    <a:bodyPr/>
+                    <a:lstStyle/>
+                    <a:p>
+                      <a:pPr>
+                        <a:defRPr sz="1050"/>
+                      </a:pPr>
+                      <a:r>
+                        <a:t>Retinoid</a:t>
+                      </a:r>
+                    </a:p>
+                  </a:txBody>
+                  <a:tcPr/>
+                </a:tc>
+              </a:tr>
+              <a:tr h="195942">
+                <a:tc>
+                  <a:txBody>
+                    <a:bodyPr/>
+                    <a:lstStyle/>
+                    <a:p>
+                      <a:pPr>
+                        <a:defRPr sz="1050"/>
+                      </a:pPr>
+                      <a:r>
+                        <a:t>axitinib</a:t>
+                      </a:r>
+                    </a:p>
+                  </a:txBody>
+                  <a:tcPr/>
+                </a:tc>
+                <a:tc>
+                  <a:txBody>
+                    <a:bodyPr/>
+                    <a:lstStyle/>
+                    <a:p>
+                      <a:pPr>
+                        <a:defRPr sz="1050"/>
+                      </a:pPr>
+                      <a:r>
+                        <a:t>0.47</a:t>
+                      </a:r>
+                    </a:p>
+                  </a:txBody>
+                  <a:tcPr/>
+                </a:tc>
+                <a:tc>
+                  <a:txBody>
+                    <a:bodyPr/>
+                    <a:lstStyle/>
+                    <a:p>
+                      <a:pPr>
+                        <a:defRPr sz="1050"/>
+                      </a:pPr>
+                      <a:r>
+                        <a:t>++.</a:t>
+                      </a:r>
+                    </a:p>
+                  </a:txBody>
+                  <a:tcPr/>
+                </a:tc>
+                <a:tc>
+                  <a:txBody>
+                    <a:bodyPr/>
+                    <a:lstStyle/>
+                    <a:p>
+                      <a:pPr>
+                        <a:defRPr sz="1050"/>
+                      </a:pPr>
+                      <a:r>
+                        <a:t>VEGFR, c-KIT and PDGFR inhibitor</a:t>
+                      </a:r>
+                    </a:p>
+                  </a:txBody>
+                  <a:tcPr/>
+                </a:tc>
+              </a:tr>
+              <a:tr h="195942">
+                <a:tc>
+                  <a:txBody>
+                    <a:bodyPr/>
+                    <a:lstStyle/>
+                    <a:p>
+                      <a:pPr>
+                        <a:defRPr sz="1050"/>
+                      </a:pPr>
+                      <a:r>
+                        <a:t>amuvatinib</a:t>
+                      </a:r>
+                    </a:p>
+                  </a:txBody>
+                  <a:tcPr/>
+                </a:tc>
+                <a:tc>
+                  <a:txBody>
+                    <a:bodyPr/>
+                    <a:lstStyle/>
+                    <a:p>
+                      <a:pPr>
+                        <a:defRPr sz="1050"/>
+                      </a:pPr>
+                      <a:r>
+                        <a:t>0.46</a:t>
+                      </a:r>
+                    </a:p>
+                  </a:txBody>
+                  <a:tcPr/>
+                </a:tc>
+                <a:tc>
+                  <a:txBody>
+                    <a:bodyPr/>
+                    <a:lstStyle/>
+                    <a:p>
+                      <a:pPr>
+                        <a:defRPr sz="1050"/>
+                      </a:pPr>
+                      <a:r>
+                        <a:t>+..</a:t>
+                      </a:r>
+                    </a:p>
+                  </a:txBody>
+                  <a:tcPr/>
+                </a:tc>
+                <a:tc>
+                  <a:txBody>
+                    <a:bodyPr/>
+                    <a:lstStyle/>
+                    <a:p>
+                      <a:pPr>
+                        <a:defRPr sz="1050"/>
+                      </a:pPr>
+                      <a:r>
+                        <a:t>Not Clinically Relevant</a:t>
+                      </a:r>
+                    </a:p>
+                  </a:txBody>
+                  <a:tcPr/>
+                </a:tc>
+              </a:tr>
+              <a:tr h="195942">
+                <a:tc>
+                  <a:txBody>
+                    <a:bodyPr/>
+                    <a:lstStyle/>
+                    <a:p>
+                      <a:pPr>
+                        <a:defRPr sz="1050"/>
+                      </a:pPr>
+                      <a:r>
+                        <a:t>rucaparib</a:t>
+                      </a:r>
+                    </a:p>
+                  </a:txBody>
+                  <a:tcPr/>
+                </a:tc>
+                <a:tc>
+                  <a:txBody>
+                    <a:bodyPr/>
+                    <a:lstStyle/>
+                    <a:p>
+                      <a:pPr>
+                        <a:defRPr sz="1050"/>
+                      </a:pPr>
+                      <a:r>
+                        <a:t>0.46</a:t>
+                      </a:r>
+                    </a:p>
+                  </a:txBody>
+                  <a:tcPr/>
+                </a:tc>
+                <a:tc>
+                  <a:txBody>
+                    <a:bodyPr/>
+                    <a:lstStyle/>
+                    <a:p>
+                      <a:pPr>
+                        <a:defRPr sz="1050"/>
+                      </a:pPr>
+                      <a:r>
+                        <a:t>+..</a:t>
+                      </a:r>
+                    </a:p>
+                  </a:txBody>
+                  <a:tcPr/>
+                </a:tc>
+                <a:tc>
+                  <a:txBody>
+                    <a:bodyPr/>
+                    <a:lstStyle/>
+                    <a:p>
+                      <a:pPr>
+                        <a:defRPr sz="1050"/>
+                      </a:pPr>
+                      <a:r>
+                        <a:t>PARP inhibitor, inhibits DNA repair</a:t>
+                      </a:r>
+                    </a:p>
+                  </a:txBody>
+                  <a:tcPr/>
+                </a:tc>
+              </a:tr>
+              <a:tr h="195942">
+                <a:tc>
+                  <a:txBody>
+                    <a:bodyPr/>
+                    <a:lstStyle/>
+                    <a:p>
+                      <a:pPr>
+                        <a:defRPr sz="1050"/>
+                      </a:pPr>
+                      <a:r>
+                        <a:t>quizartinib</a:t>
+                      </a:r>
+                    </a:p>
+                  </a:txBody>
+                  <a:tcPr/>
+                </a:tc>
+                <a:tc>
+                  <a:txBody>
+                    <a:bodyPr/>
+                    <a:lstStyle/>
+                    <a:p>
+                      <a:pPr>
+                        <a:defRPr sz="1050"/>
+                      </a:pPr>
+                      <a:r>
+                        <a:t>0.45</a:t>
+                      </a:r>
+                    </a:p>
+                  </a:txBody>
+                  <a:tcPr/>
+                </a:tc>
+                <a:tc>
+                  <a:txBody>
+                    <a:bodyPr/>
+                    <a:lstStyle/>
+                    <a:p>
+                      <a:pPr>
+                        <a:defRPr sz="1050"/>
+                      </a:pPr>
+                      <a:r>
+                        <a:t>++.</a:t>
+                      </a:r>
+                    </a:p>
+                  </a:txBody>
+                  <a:tcPr/>
+                </a:tc>
+                <a:tc>
+                  <a:txBody>
+                    <a:bodyPr/>
+                    <a:lstStyle/>
+                    <a:p>
+                      <a:pPr>
+                        <a:defRPr sz="1050"/>
+                      </a:pPr>
+                      <a:r>
+                        <a:t>Flt3 inhibitor</a:t>
+                      </a:r>
+                    </a:p>
+                  </a:txBody>
+                  <a:tcPr/>
+                </a:tc>
+              </a:tr>
+              <a:tr h="195942">
+                <a:tc>
+                  <a:txBody>
+                    <a:bodyPr/>
+                    <a:lstStyle/>
+                    <a:p>
+                      <a:pPr>
+                        <a:defRPr sz="1050"/>
+                      </a:pPr>
+                      <a:r>
+                        <a:t>xmd13-2</a:t>
+                      </a:r>
+                    </a:p>
+                  </a:txBody>
+                  <a:tcPr/>
+                </a:tc>
+                <a:tc>
+                  <a:txBody>
+                    <a:bodyPr/>
+                    <a:lstStyle/>
+                    <a:p>
+                      <a:pPr>
+                        <a:defRPr sz="1050"/>
+                      </a:pPr>
+                      <a:r>
+                        <a:t>0.44</a:t>
+                      </a:r>
+                    </a:p>
+                  </a:txBody>
+                  <a:tcPr/>
+                </a:tc>
+                <a:tc>
+                  <a:txBody>
+                    <a:bodyPr/>
+                    <a:lstStyle/>
+                    <a:p>
+                      <a:pPr>
+                        <a:defRPr sz="1050"/>
+                      </a:pPr>
+                      <a:r>
+                        <a:t>+..</a:t>
+                      </a:r>
+                    </a:p>
+                  </a:txBody>
+                  <a:tcPr/>
+                </a:tc>
+                <a:tc>
+                  <a:txBody>
+                    <a:bodyPr/>
+                    <a:lstStyle/>
+                    <a:p>
+                      <a:pPr>
+                        <a:defRPr sz="1050"/>
+                      </a:pPr>
+                      <a:r>
+                        <a:t>Not Clinically Relevant</a:t>
+                      </a:r>
+                    </a:p>
+                  </a:txBody>
+                  <a:tcPr/>
+                </a:tc>
+              </a:tr>
+              <a:tr h="195942">
+                <a:tc>
+                  <a:txBody>
+                    <a:bodyPr/>
+                    <a:lstStyle/>
+                    <a:p>
+                      <a:pPr>
+                        <a:defRPr sz="1050"/>
+                      </a:pPr>
+                      <a:r>
+                        <a:t>hg-5-88-01</a:t>
+                      </a:r>
+                    </a:p>
+                  </a:txBody>
+                  <a:tcPr/>
+                </a:tc>
+                <a:tc>
+                  <a:txBody>
+                    <a:bodyPr/>
+                    <a:lstStyle/>
+                    <a:p>
+                      <a:pPr>
+                        <a:defRPr sz="1050"/>
+                      </a:pPr>
+                      <a:r>
+                        <a:t>0.44</a:t>
+                      </a:r>
+                    </a:p>
+                  </a:txBody>
+                  <a:tcPr/>
+                </a:tc>
+                <a:tc>
+                  <a:txBody>
+                    <a:bodyPr/>
+                    <a:lstStyle/>
+                    <a:p>
+                      <a:pPr>
+                        <a:defRPr sz="1050"/>
+                      </a:pPr>
+                      <a:r>
+                        <a:t>+..</a:t>
+                      </a:r>
+                    </a:p>
+                  </a:txBody>
+                  <a:tcPr/>
+                </a:tc>
+                <a:tc>
+                  <a:txBody>
+                    <a:bodyPr/>
+                    <a:lstStyle/>
+                    <a:p>
+                      <a:pPr>
+                        <a:defRPr sz="1050"/>
+                      </a:pPr>
+                      <a:r>
+                        <a:t>Not Clinically Relevant</a:t>
+                      </a:r>
+                    </a:p>
+                  </a:txBody>
+                  <a:tcPr/>
+                </a:tc>
+              </a:tr>
+              <a:tr h="195942">
+                <a:tc>
+                  <a:txBody>
+                    <a:bodyPr/>
+                    <a:lstStyle/>
+                    <a:p>
+                      <a:pPr>
+                        <a:defRPr sz="1050"/>
+                      </a:pPr>
+                      <a:r>
+                        <a:t>avrainvillamide</a:t>
+                      </a:r>
+                    </a:p>
+                  </a:txBody>
+                  <a:tcPr/>
+                </a:tc>
+                <a:tc>
+                  <a:txBody>
+                    <a:bodyPr/>
+                    <a:lstStyle/>
+                    <a:p>
+                      <a:pPr>
+                        <a:defRPr sz="1050"/>
+                      </a:pPr>
+                      <a:r>
+                        <a:t>0.43</a:t>
+                      </a:r>
+                    </a:p>
+                  </a:txBody>
+                  <a:tcPr/>
+                </a:tc>
+                <a:tc>
+                  <a:txBody>
+                    <a:bodyPr/>
+                    <a:lstStyle/>
+                    <a:p>
+                      <a:pPr>
+                        <a:defRPr sz="1050"/>
+                      </a:pPr>
+                      <a:r>
+                        <a:t>.+.</a:t>
+                      </a:r>
+                    </a:p>
+                  </a:txBody>
+                  <a:tcPr/>
+                </a:tc>
+                <a:tc>
+                  <a:txBody>
+                    <a:bodyPr/>
+                    <a:lstStyle/>
+                    <a:p>
+                      <a:pPr>
+                        <a:defRPr sz="1050"/>
+                      </a:pPr>
+                      <a:r>
+                        <a:t>Not Clinically Relevant</a:t>
+                      </a:r>
+                    </a:p>
+                  </a:txBody>
+                  <a:tcPr/>
+                </a:tc>
+              </a:tr>
+              <a:tr h="195960">
+                <a:tc>
+                  <a:txBody>
+                    <a:bodyPr/>
+                    <a:lstStyle/>
+                    <a:p>
+                      <a:pPr>
+                        <a:defRPr sz="1050"/>
+                      </a:pPr>
+                      <a:r>
+                        <a:t>sb-505124</a:t>
+                      </a:r>
+                    </a:p>
+                  </a:txBody>
+                  <a:tcPr/>
+                </a:tc>
+                <a:tc>
+                  <a:txBody>
+                    <a:bodyPr/>
+                    <a:lstStyle/>
+                    <a:p>
+                      <a:pPr>
+                        <a:defRPr sz="1050"/>
+                      </a:pPr>
+                      <a:r>
+                        <a:t>0.42</a:t>
+                      </a:r>
+                    </a:p>
+                  </a:txBody>
+                  <a:tcPr/>
+                </a:tc>
+                <a:tc>
+                  <a:txBody>
+                    <a:bodyPr/>
+                    <a:lstStyle/>
+                    <a:p>
+                      <a:pPr>
+                        <a:defRPr sz="1050"/>
+                      </a:pPr>
+                      <a:r>
+                        <a:t>+..</a:t>
+                      </a:r>
+                    </a:p>
+                  </a:txBody>
+                  <a:tcPr/>
+                </a:tc>
+                <a:tc>
+                  <a:txBody>
+                    <a:bodyPr/>
+                    <a:lstStyle/>
+                    <a:p>
+                      <a:pPr>
+                        <a:defRPr sz="1050"/>
+                      </a:pPr>
+                      <a:r>
+                        <a:t>Not Clinically Relevant</a:t>
+                      </a:r>
+                    </a:p>
+                  </a:txBody>
+                  <a:tcPr/>
+                </a:tc>
+              </a:tr>
+            </a:tbl>
+          </a:graphicData>
+        </a:graphic>
+      </p:graphicFrame>
+    </p:spTree>
+  </p:cSld>
+  <p:clrMapOvr>
+    <a:masterClrMapping/>
+  </p:clrMapOvr>
+</p:sld>
+</file>
+
+<file path=ppt/slides/slide4.xml><?xml version="1.0" encoding="utf-8"?>
+<p:sld xmlns:a="http://schemas.openxmlformats.org/drawingml/2006/main" xmlns:p="http://schemas.openxmlformats.org/presentationml/2006/main" xmlns:r="http://schemas.openxmlformats.org/officeDocument/2006/relationships">
+  <p:cSld>
+    <p:spTree>
+      <p:nvGrpSpPr>
+        <p:cNvPr id="1" name=""/>
+        <p:cNvGrpSpPr/>
+        <p:nvPr/>
+      </p:nvGrpSpPr>
+      <p:grpSpPr/>
+      <p:sp>
+        <p:nvSpPr>
+          <p:cNvPr id="2" name="TextBox 1"/>
+          <p:cNvSpPr txBox="1"/>
+          <p:nvPr/>
+        </p:nvSpPr>
+        <p:spPr>
+          <a:xfrm>
+            <a:off x="0" y="0"/>
+            <a:ext cx="9144000" cy="685800"/>
+          </a:xfrm>
+          <a:prstGeom prst="rect">
+            <a:avLst/>
+          </a:prstGeom>
+          <a:noFill/>
+        </p:spPr>
+        <p:txBody>
+          <a:bodyPr wrap="none">
+            <a:spAutoFit/>
+          </a:bodyPr>
+          <a:lstStyle/>
+          <a:p/>
+          <a:p>
+            <a:pPr>
+              <a:defRPr sz="2600"/>
+            </a:pPr>
+            <a:r>
+              <a:t>CMap: top drugs (cerebellar stem cell control)</a:t>
+            </a:r>
+          </a:p>
+        </p:txBody>
+      </p:sp>
+      <p:graphicFrame>
+        <p:nvGraphicFramePr>
+          <p:cNvPr id="3" name="Table 2"/>
+          <p:cNvGraphicFramePr>
+            <a:graphicFrameLocks noGrp="1"/>
+          </p:cNvGraphicFramePr>
+          <p:nvPr/>
+        </p:nvGraphicFramePr>
+        <p:xfrm>
+          <a:off x="411480" y="777240"/>
+          <a:ext cx="8138160" cy="4114800"/>
+        </p:xfrm>
+        <a:graphic>
+          <a:graphicData uri="http://schemas.openxmlformats.org/drawingml/2006/table">
+            <a:tbl>
+              <a:tblPr firstRow="1" bandRow="1">
+                <a:tableStyleId>{5C22544A-7EE6-4342-B048-85BDC9FD1C3A}</a:tableStyleId>
+              </a:tblPr>
+              <a:tblGrid>
+                <a:gridCol w="1005840"/>
+                <a:gridCol w="731520"/>
+                <a:gridCol w="6400800"/>
+              </a:tblGrid>
+              <a:tr h="195942">
+                <a:tc>
+                  <a:txBody>
+                    <a:bodyPr/>
+                    <a:lstStyle/>
+                    <a:p>
+                      <a:r>
+                        <a:t>Drug</a:t>
+                      </a:r>
+                    </a:p>
+                  </a:txBody>
+                  <a:tcPr/>
+                </a:tc>
+                <a:tc>
+                  <a:txBody>
+                    <a:bodyPr/>
+                    <a:lstStyle/>
+                    <a:p>
+                      <a:r>
+                        <a:t>Score</a:t>
+                      </a:r>
+                    </a:p>
+                  </a:txBody>
+                  <a:tcPr/>
+                </a:tc>
+                <a:tc>
+                  <a:txBody>
+                    <a:bodyPr/>
+                    <a:lstStyle/>
+                    <a:p>
+                      <a:r>
+                        <a:t>Mechanism of action</a:t>
+                      </a:r>
+                    </a:p>
+                  </a:txBody>
+                  <a:tcPr/>
+                </a:tc>
+              </a:tr>
+              <a:tr h="195942">
+                <a:tc>
+                  <a:txBody>
+                    <a:bodyPr/>
+                    <a:lstStyle/>
+                    <a:p>
+                      <a:pPr>
+                        <a:defRPr sz="1050"/>
+                      </a:pPr>
+                      <a:r>
+                        <a:t>sitagliptin</a:t>
+                      </a:r>
+                    </a:p>
+                  </a:txBody>
+                  <a:tcPr/>
+                </a:tc>
+                <a:tc>
+                  <a:txBody>
+                    <a:bodyPr/>
+                    <a:lstStyle/>
+                    <a:p>
+                      <a:pPr>
+                        <a:defRPr sz="1050"/>
+                      </a:pPr>
+                      <a:r>
+                        <a:t>0.99</a:t>
+                      </a:r>
+                    </a:p>
+                  </a:txBody>
+                  <a:tcPr/>
+                </a:tc>
+                <a:tc>
+                  <a:txBody>
+                    <a:bodyPr/>
+                    <a:lstStyle/>
+                    <a:p>
+                      <a:pPr>
+                        <a:defRPr sz="1050"/>
+                      </a:pPr>
+                      <a:r>
+                        <a:t>used for Treating type 2 diabetes, works by increasing the amount of insulin released by your body</a:t>
+                      </a:r>
+                    </a:p>
+                  </a:txBody>
+                  <a:tcPr/>
+                </a:tc>
+              </a:tr>
+              <a:tr h="195942">
+                <a:tc>
+                  <a:txBody>
+                    <a:bodyPr/>
+                    <a:lstStyle/>
+                    <a:p>
+                      <a:pPr>
+                        <a:defRPr sz="1050"/>
+                      </a:pPr>
+                      <a:r>
+                        <a:t>lenalidomide</a:t>
+                      </a:r>
+                    </a:p>
+                  </a:txBody>
+                  <a:tcPr/>
+                </a:tc>
+                <a:tc>
+                  <a:txBody>
+                    <a:bodyPr/>
+                    <a:lstStyle/>
+                    <a:p>
+                      <a:pPr>
+                        <a:defRPr sz="1050"/>
+                      </a:pPr>
+                      <a:r>
+                        <a:t>0.99</a:t>
+                      </a:r>
+                    </a:p>
+                  </a:txBody>
+                  <a:tcPr/>
+                </a:tc>
+                <a:tc>
+                  <a:txBody>
+                    <a:bodyPr/>
+                    <a:lstStyle/>
+                    <a:p>
+                      <a:pPr>
+                        <a:defRPr sz="1050"/>
+                      </a:pPr>
+                      <a:r>
+                        <a:t>derivative of thalidomide, which interacts with the ubiquitin E3 ligase cereblon, targeting this enzyme to degrade the Ikaros transcription factors IKZF1 and IKZF3. Used for multiple myeloma</a:t>
+                      </a:r>
+                    </a:p>
+                  </a:txBody>
+                  <a:tcPr/>
+                </a:tc>
+              </a:tr>
+              <a:tr h="195942">
+                <a:tc>
+                  <a:txBody>
+                    <a:bodyPr/>
+                    <a:lstStyle/>
+                    <a:p>
+                      <a:pPr>
+                        <a:defRPr sz="1050"/>
+                      </a:pPr>
+                      <a:r>
+                        <a:t>lapatinib</a:t>
+                      </a:r>
+                    </a:p>
+                  </a:txBody>
+                  <a:tcPr/>
+                </a:tc>
+                <a:tc>
+                  <a:txBody>
+                    <a:bodyPr/>
+                    <a:lstStyle/>
+                    <a:p>
+                      <a:pPr>
+                        <a:defRPr sz="1050"/>
+                      </a:pPr>
+                      <a:r>
+                        <a:t>0.99</a:t>
+                      </a:r>
+                    </a:p>
+                  </a:txBody>
+                  <a:tcPr/>
+                </a:tc>
+                <a:tc>
+                  <a:txBody>
+                    <a:bodyPr/>
+                    <a:lstStyle/>
+                    <a:p>
+                      <a:pPr>
+                        <a:defRPr sz="1050"/>
+                      </a:pPr>
+                      <a:r>
+                        <a:t>HER2/EGFR inhibitor</a:t>
+                      </a:r>
+                    </a:p>
+                  </a:txBody>
+                  <a:tcPr/>
+                </a:tc>
+              </a:tr>
+              <a:tr h="195942">
+                <a:tc>
+                  <a:txBody>
+                    <a:bodyPr/>
+                    <a:lstStyle/>
+                    <a:p>
+                      <a:pPr>
+                        <a:defRPr sz="1050"/>
+                      </a:pPr>
+                      <a:r>
+                        <a:t>temozolomide</a:t>
+                      </a:r>
+                    </a:p>
+                  </a:txBody>
+                  <a:tcPr/>
+                </a:tc>
+                <a:tc>
+                  <a:txBody>
+                    <a:bodyPr/>
+                    <a:lstStyle/>
+                    <a:p>
+                      <a:pPr>
+                        <a:defRPr sz="1050"/>
+                      </a:pPr>
+                      <a:r>
+                        <a:t>0.98</a:t>
+                      </a:r>
+                    </a:p>
+                  </a:txBody>
+                  <a:tcPr/>
+                </a:tc>
+                <a:tc>
+                  <a:txBody>
+                    <a:bodyPr/>
+                    <a:lstStyle/>
+                    <a:p>
+                      <a:pPr>
+                        <a:defRPr sz="1050"/>
+                      </a:pPr>
+                      <a:r>
+                        <a:t>alkylating agent</a:t>
+                      </a:r>
+                    </a:p>
+                  </a:txBody>
+                  <a:tcPr/>
+                </a:tc>
+              </a:tr>
+              <a:tr h="195942">
+                <a:tc>
+                  <a:txBody>
+                    <a:bodyPr/>
+                    <a:lstStyle/>
+                    <a:p>
+                      <a:pPr>
+                        <a:defRPr sz="1050"/>
+                      </a:pPr>
+                      <a:r>
+                        <a:t>tretinoin</a:t>
+                      </a:r>
+                    </a:p>
+                  </a:txBody>
+                  <a:tcPr/>
+                </a:tc>
+                <a:tc>
+                  <a:txBody>
+                    <a:bodyPr/>
+                    <a:lstStyle/>
+                    <a:p>
+                      <a:pPr>
+                        <a:defRPr sz="1050"/>
+                      </a:pPr>
+                      <a:r>
+                        <a:t>0.98</a:t>
+                      </a:r>
+                    </a:p>
+                  </a:txBody>
+                  <a:tcPr/>
+                </a:tc>
+                <a:tc>
+                  <a:txBody>
+                    <a:bodyPr/>
+                    <a:lstStyle/>
+                    <a:p>
+                      <a:pPr>
+                        <a:defRPr sz="1050"/>
+                      </a:pPr>
+                      <a:r>
+                        <a:t>Retinoid</a:t>
+                      </a:r>
+                    </a:p>
+                  </a:txBody>
+                  <a:tcPr/>
+                </a:tc>
+              </a:tr>
+              <a:tr h="195942">
+                <a:tc>
+                  <a:txBody>
+                    <a:bodyPr/>
+                    <a:lstStyle/>
+                    <a:p>
+                      <a:pPr>
+                        <a:defRPr sz="1050"/>
+                      </a:pPr>
+                      <a:r>
+                        <a:t>thiotepa</a:t>
+                      </a:r>
+                    </a:p>
+                  </a:txBody>
+                  <a:tcPr/>
+                </a:tc>
+                <a:tc>
+                  <a:txBody>
+                    <a:bodyPr/>
+                    <a:lstStyle/>
+                    <a:p>
+                      <a:pPr>
+                        <a:defRPr sz="1050"/>
+                      </a:pPr>
+                      <a:r>
+                        <a:t>0.96</a:t>
+                      </a:r>
+                    </a:p>
+                  </a:txBody>
+                  <a:tcPr/>
+                </a:tc>
+                <a:tc>
+                  <a:txBody>
+                    <a:bodyPr/>
+                    <a:lstStyle/>
+                    <a:p>
+                      <a:pPr>
+                        <a:defRPr sz="1050"/>
+                      </a:pPr>
+                      <a:r>
+                        <a:t>alkylating agent, ethylenimine family, causes crosslinks in DNA, which prevents DNA replication and DNA transcription</a:t>
+                      </a:r>
+                    </a:p>
+                  </a:txBody>
+                  <a:tcPr/>
+                </a:tc>
+              </a:tr>
+              <a:tr h="195942">
+                <a:tc>
+                  <a:txBody>
+                    <a:bodyPr/>
+                    <a:lstStyle/>
+                    <a:p>
+                      <a:pPr>
+                        <a:defRPr sz="1050"/>
+                      </a:pPr>
+                      <a:r>
+                        <a:t>hydrocortisone</a:t>
+                      </a:r>
+                    </a:p>
+                  </a:txBody>
+                  <a:tcPr/>
+                </a:tc>
+                <a:tc>
+                  <a:txBody>
+                    <a:bodyPr/>
+                    <a:lstStyle/>
+                    <a:p>
+                      <a:pPr>
+                        <a:defRPr sz="1050"/>
+                      </a:pPr>
+                      <a:r>
+                        <a:t>0.95</a:t>
+                      </a:r>
+                    </a:p>
+                  </a:txBody>
+                  <a:tcPr/>
+                </a:tc>
+                <a:tc>
+                  <a:txBody>
+                    <a:bodyPr/>
+                    <a:lstStyle/>
+                    <a:p>
+                      <a:pPr>
+                        <a:defRPr sz="1050"/>
+                      </a:pPr>
+                      <a:r>
+                        <a:t>Anti-inflammatory</a:t>
+                      </a:r>
+                    </a:p>
+                  </a:txBody>
+                  <a:tcPr/>
+                </a:tc>
+              </a:tr>
+              <a:tr h="195942">
+                <a:tc>
+                  <a:txBody>
+                    <a:bodyPr/>
+                    <a:lstStyle/>
+                    <a:p>
+                      <a:pPr>
+                        <a:defRPr sz="1050"/>
+                      </a:pPr>
+                      <a:r>
+                        <a:t>escitalopram</a:t>
+                      </a:r>
+                    </a:p>
+                  </a:txBody>
+                  <a:tcPr/>
+                </a:tc>
+                <a:tc>
+                  <a:txBody>
+                    <a:bodyPr/>
+                    <a:lstStyle/>
+                    <a:p>
+                      <a:pPr>
+                        <a:defRPr sz="1050"/>
+                      </a:pPr>
+                      <a:r>
+                        <a:t>0.95</a:t>
+                      </a:r>
+                    </a:p>
+                  </a:txBody>
+                  <a:tcPr/>
+                </a:tc>
+                <a:tc>
+                  <a:txBody>
+                    <a:bodyPr/>
+                    <a:lstStyle/>
+                    <a:p>
+                      <a:pPr>
+                        <a:defRPr sz="1050"/>
+                      </a:pPr>
+                      <a:r>
+                        <a:t>Selective Serotonin Reuptake Inhibitor (SSRI)</a:t>
+                      </a:r>
+                    </a:p>
+                  </a:txBody>
+                  <a:tcPr/>
+                </a:tc>
+              </a:tr>
+              <a:tr h="195942">
+                <a:tc>
+                  <a:txBody>
+                    <a:bodyPr/>
+                    <a:lstStyle/>
+                    <a:p>
+                      <a:pPr>
+                        <a:defRPr sz="1050"/>
+                      </a:pPr>
+                      <a:r>
+                        <a:t>raltitrexed</a:t>
+                      </a:r>
+                    </a:p>
+                  </a:txBody>
+                  <a:tcPr/>
+                </a:tc>
+                <a:tc>
+                  <a:txBody>
+                    <a:bodyPr/>
+                    <a:lstStyle/>
+                    <a:p>
+                      <a:pPr>
+                        <a:defRPr sz="1050"/>
+                      </a:pPr>
+                      <a:r>
+                        <a:t>0.95</a:t>
+                      </a:r>
+                    </a:p>
+                  </a:txBody>
+                  <a:tcPr/>
+                </a:tc>
+                <a:tc>
+                  <a:txBody>
+                    <a:bodyPr/>
+                    <a:lstStyle/>
+                    <a:p>
+                      <a:pPr>
+                        <a:defRPr sz="1050"/>
+                      </a:pPr>
+                      <a:r>
+                        <a:t>antimetabolite,  inhibitor of thymidylate synthase</a:t>
+                      </a:r>
+                    </a:p>
+                  </a:txBody>
+                  <a:tcPr/>
+                </a:tc>
+              </a:tr>
+              <a:tr h="195942">
+                <a:tc>
+                  <a:txBody>
+                    <a:bodyPr/>
+                    <a:lstStyle/>
+                    <a:p>
+                      <a:pPr>
+                        <a:defRPr sz="1050"/>
+                      </a:pPr>
+                      <a:r>
+                        <a:t>rucaparib</a:t>
+                      </a:r>
+                    </a:p>
+                  </a:txBody>
+                  <a:tcPr/>
+                </a:tc>
+                <a:tc>
+                  <a:txBody>
+                    <a:bodyPr/>
+                    <a:lstStyle/>
+                    <a:p>
+                      <a:pPr>
+                        <a:defRPr sz="1050"/>
+                      </a:pPr>
+                      <a:r>
+                        <a:t>0.95</a:t>
+                      </a:r>
+                    </a:p>
+                  </a:txBody>
+                  <a:tcPr/>
+                </a:tc>
+                <a:tc>
+                  <a:txBody>
+                    <a:bodyPr/>
+                    <a:lstStyle/>
+                    <a:p>
+                      <a:pPr>
+                        <a:defRPr sz="1050"/>
+                      </a:pPr>
+                      <a:r>
+                        <a:t>PARP inhibitor, inhibits DNA repair</a:t>
+                      </a:r>
+                    </a:p>
+                  </a:txBody>
+                  <a:tcPr/>
+                </a:tc>
+              </a:tr>
+              <a:tr h="195942">
+                <a:tc>
+                  <a:txBody>
+                    <a:bodyPr/>
+                    <a:lstStyle/>
+                    <a:p>
+                      <a:pPr>
+                        <a:defRPr sz="1050"/>
+                      </a:pPr>
+                      <a:r>
+                        <a:t>vinorelbine</a:t>
+                      </a:r>
+                    </a:p>
+                  </a:txBody>
+                  <a:tcPr/>
+                </a:tc>
+                <a:tc>
+                  <a:txBody>
+                    <a:bodyPr/>
+                    <a:lstStyle/>
+                    <a:p>
+                      <a:pPr>
+                        <a:defRPr sz="1050"/>
+                      </a:pPr>
+                      <a:r>
+                        <a:t>0.95</a:t>
+                      </a:r>
+                    </a:p>
+                  </a:txBody>
+                  <a:tcPr/>
+                </a:tc>
+                <a:tc>
+                  <a:txBody>
+                    <a:bodyPr/>
+                    <a:lstStyle/>
+                    <a:p>
+                      <a:pPr>
+                        <a:defRPr sz="1050"/>
+                      </a:pPr>
+                      <a:r>
+                        <a:t>disrupts microtubule dynamics; natural product</a:t>
+                      </a:r>
+                    </a:p>
+                  </a:txBody>
+                  <a:tcPr/>
+                </a:tc>
+              </a:tr>
+              <a:tr h="195942">
+                <a:tc>
+                  <a:txBody>
+                    <a:bodyPr/>
+                    <a:lstStyle/>
+                    <a:p>
+                      <a:pPr>
+                        <a:defRPr sz="1050"/>
+                      </a:pPr>
+                      <a:r>
+                        <a:t>cladribine</a:t>
+                      </a:r>
+                    </a:p>
+                  </a:txBody>
+                  <a:tcPr/>
+                </a:tc>
+                <a:tc>
+                  <a:txBody>
+                    <a:bodyPr/>
+                    <a:lstStyle/>
+                    <a:p>
+                      <a:pPr>
+                        <a:defRPr sz="1050"/>
+                      </a:pPr>
+                      <a:r>
+                        <a:t>0.94</a:t>
+                      </a:r>
+                    </a:p>
+                  </a:txBody>
+                  <a:tcPr/>
+                </a:tc>
+                <a:tc>
+                  <a:txBody>
+                    <a:bodyPr/>
+                    <a:lstStyle/>
+                    <a:p>
+                      <a:pPr>
+                        <a:defRPr sz="1050"/>
+                      </a:pPr>
+                      <a:r>
+                        <a:t>purine analog, inhibits adenosine deaminase, which interferes with DNA sythesis. Used for leukemia</a:t>
+                      </a:r>
+                    </a:p>
+                  </a:txBody>
+                  <a:tcPr/>
+                </a:tc>
+              </a:tr>
+              <a:tr h="195942">
+                <a:tc>
+                  <a:txBody>
+                    <a:bodyPr/>
+                    <a:lstStyle/>
+                    <a:p>
+                      <a:pPr>
+                        <a:defRPr sz="1050"/>
+                      </a:pPr>
+                      <a:r>
+                        <a:t>GSK-461364</a:t>
+                      </a:r>
+                    </a:p>
+                  </a:txBody>
+                  <a:tcPr/>
+                </a:tc>
+                <a:tc>
+                  <a:txBody>
+                    <a:bodyPr/>
+                    <a:lstStyle/>
+                    <a:p>
+                      <a:pPr>
+                        <a:defRPr sz="1050"/>
+                      </a:pPr>
+                      <a:r>
+                        <a:t>0.94</a:t>
+                      </a:r>
+                    </a:p>
+                  </a:txBody>
+                  <a:tcPr/>
+                </a:tc>
+                <a:tc>
+                  <a:txBody>
+                    <a:bodyPr/>
+                    <a:lstStyle/>
+                    <a:p>
+                      <a:pPr>
+                        <a:defRPr sz="1050"/>
+                      </a:pPr>
+                      <a:r>
+                        <a:t>Plk1 inhibitor, less active against Plk2 and Plk3.</a:t>
+                      </a:r>
+                    </a:p>
+                  </a:txBody>
+                  <a:tcPr/>
+                </a:tc>
+              </a:tr>
+              <a:tr h="195942">
+                <a:tc>
+                  <a:txBody>
+                    <a:bodyPr/>
+                    <a:lstStyle/>
+                    <a:p>
+                      <a:pPr>
+                        <a:defRPr sz="1050"/>
+                      </a:pPr>
+                      <a:r>
+                        <a:t>formestane</a:t>
+                      </a:r>
+                    </a:p>
+                  </a:txBody>
+                  <a:tcPr/>
+                </a:tc>
+                <a:tc>
+                  <a:txBody>
+                    <a:bodyPr/>
+                    <a:lstStyle/>
+                    <a:p>
+                      <a:pPr>
+                        <a:defRPr sz="1050"/>
+                      </a:pPr>
+                      <a:r>
+                        <a:t>0.93</a:t>
+                      </a:r>
+                    </a:p>
+                  </a:txBody>
+                  <a:tcPr/>
+                </a:tc>
+                <a:tc>
+                  <a:txBody>
+                    <a:bodyPr/>
+                    <a:lstStyle/>
+                    <a:p>
+                      <a:pPr>
+                        <a:defRPr sz="1050"/>
+                      </a:pPr>
+                      <a:r>
+                        <a:t>steroidal, selective aromatase inhibitor, used for ER+ Breast cancer</a:t>
+                      </a:r>
+                    </a:p>
+                  </a:txBody>
+                  <a:tcPr/>
+                </a:tc>
+              </a:tr>
+              <a:tr h="195942">
+                <a:tc>
+                  <a:txBody>
+                    <a:bodyPr/>
+                    <a:lstStyle/>
+                    <a:p>
+                      <a:pPr>
+                        <a:defRPr sz="1050"/>
+                      </a:pPr>
+                      <a:r>
+                        <a:t>alisertib</a:t>
+                      </a:r>
+                    </a:p>
+                  </a:txBody>
+                  <a:tcPr/>
+                </a:tc>
+                <a:tc>
+                  <a:txBody>
+                    <a:bodyPr/>
+                    <a:lstStyle/>
+                    <a:p>
+                      <a:pPr>
+                        <a:defRPr sz="1050"/>
+                      </a:pPr>
+                      <a:r>
+                        <a:t>0.92</a:t>
+                      </a:r>
+                    </a:p>
+                  </a:txBody>
+                  <a:tcPr/>
+                </a:tc>
+                <a:tc>
+                  <a:txBody>
+                    <a:bodyPr/>
+                    <a:lstStyle/>
+                    <a:p>
+                      <a:pPr>
+                        <a:defRPr sz="1050"/>
+                      </a:pPr>
+                      <a:r>
+                        <a:t>Aurora A kinase inhibitor</a:t>
+                      </a:r>
+                    </a:p>
+                  </a:txBody>
+                  <a:tcPr/>
+                </a:tc>
+              </a:tr>
+              <a:tr h="195942">
+                <a:tc>
+                  <a:txBody>
+                    <a:bodyPr/>
+                    <a:lstStyle/>
+                    <a:p>
+                      <a:pPr>
+                        <a:defRPr sz="1050"/>
+                      </a:pPr>
+                      <a:r>
+                        <a:t>irinotecan</a:t>
+                      </a:r>
+                    </a:p>
+                  </a:txBody>
+                  <a:tcPr/>
+                </a:tc>
+                <a:tc>
+                  <a:txBody>
+                    <a:bodyPr/>
+                    <a:lstStyle/>
+                    <a:p>
+                      <a:pPr>
+                        <a:defRPr sz="1050"/>
+                      </a:pPr>
+                      <a:r>
+                        <a:t>0.92</a:t>
+                      </a:r>
+                    </a:p>
+                  </a:txBody>
+                  <a:tcPr/>
+                </a:tc>
+                <a:tc>
+                  <a:txBody>
+                    <a:bodyPr/>
+                    <a:lstStyle/>
+                    <a:p>
+                      <a:pPr>
+                        <a:defRPr sz="1050"/>
+                      </a:pPr>
+                      <a:r>
+                        <a:t>aka CPT-11, inhibitor of Topo I</a:t>
+                      </a:r>
+                    </a:p>
+                  </a:txBody>
+                  <a:tcPr/>
+                </a:tc>
+              </a:tr>
+              <a:tr h="195942">
+                <a:tc>
+                  <a:txBody>
+                    <a:bodyPr/>
+                    <a:lstStyle/>
+                    <a:p>
+                      <a:pPr>
+                        <a:defRPr sz="1050"/>
+                      </a:pPr>
+                      <a:r>
+                        <a:t>tacrolimus</a:t>
+                      </a:r>
+                    </a:p>
+                  </a:txBody>
+                  <a:tcPr/>
+                </a:tc>
+                <a:tc>
+                  <a:txBody>
+                    <a:bodyPr/>
+                    <a:lstStyle/>
+                    <a:p>
+                      <a:pPr>
+                        <a:defRPr sz="1050"/>
+                      </a:pPr>
+                      <a:r>
+                        <a:t>0.91</a:t>
+                      </a:r>
+                    </a:p>
+                  </a:txBody>
+                  <a:tcPr/>
+                </a:tc>
+                <a:tc>
+                  <a:txBody>
+                    <a:bodyPr/>
+                    <a:lstStyle/>
+                    <a:p>
+                      <a:pPr>
+                        <a:defRPr sz="1050"/>
+                      </a:pPr>
+                      <a:r>
+                        <a:t>FK-506, immunosuppressive drug usedafter allogeneic organ transplant</a:t>
+                      </a:r>
+                    </a:p>
+                  </a:txBody>
+                  <a:tcPr/>
+                </a:tc>
+              </a:tr>
+              <a:tr h="195942">
+                <a:tc>
+                  <a:txBody>
+                    <a:bodyPr/>
+                    <a:lstStyle/>
+                    <a:p>
+                      <a:pPr>
+                        <a:defRPr sz="1050"/>
+                      </a:pPr>
+                      <a:r>
+                        <a:t>CS-1657</a:t>
+                      </a:r>
+                    </a:p>
+                  </a:txBody>
+                  <a:tcPr/>
+                </a:tc>
+                <a:tc>
+                  <a:txBody>
+                    <a:bodyPr/>
+                    <a:lstStyle/>
+                    <a:p>
+                      <a:pPr>
+                        <a:defRPr sz="1050"/>
+                      </a:pPr>
+                      <a:r>
+                        <a:t>0.9</a:t>
+                      </a:r>
+                    </a:p>
+                  </a:txBody>
+                  <a:tcPr/>
+                </a:tc>
+                <a:tc>
+                  <a:txBody>
+                    <a:bodyPr/>
+                    <a:lstStyle/>
+                    <a:p>
+                      <a:pPr>
+                        <a:defRPr sz="1050"/>
+                      </a:pPr>
+                      <a:r>
+                        <a:t>Ixazomib, Proteasome inhibitor, inhibits the chymotrypsin-like proteolytic (β5) site of the 20S proteasome </a:t>
+                      </a:r>
+                    </a:p>
+                  </a:txBody>
+                  <a:tcPr/>
+                </a:tc>
+              </a:tr>
+              <a:tr h="195942">
+                <a:tc>
+                  <a:txBody>
+                    <a:bodyPr/>
+                    <a:lstStyle/>
+                    <a:p>
+                      <a:pPr>
+                        <a:defRPr sz="1050"/>
+                      </a:pPr>
+                      <a:r>
+                        <a:t>vincristine</a:t>
+                      </a:r>
+                    </a:p>
+                  </a:txBody>
+                  <a:tcPr/>
+                </a:tc>
+                <a:tc>
+                  <a:txBody>
+                    <a:bodyPr/>
+                    <a:lstStyle/>
+                    <a:p>
+                      <a:pPr>
+                        <a:defRPr sz="1050"/>
+                      </a:pPr>
+                      <a:r>
+                        <a:t>0.9</a:t>
+                      </a:r>
+                    </a:p>
+                  </a:txBody>
+                  <a:tcPr/>
+                </a:tc>
+                <a:tc>
+                  <a:txBody>
+                    <a:bodyPr/>
+                    <a:lstStyle/>
+                    <a:p>
+                      <a:pPr>
+                        <a:defRPr sz="1050"/>
+                      </a:pPr>
+                      <a:r>
+                        <a:t>binds tubulin, disrupts microtubule dynamics</a:t>
+                      </a:r>
+                    </a:p>
+                  </a:txBody>
+                  <a:tcPr/>
+                </a:tc>
+              </a:tr>
+              <a:tr h="195960">
+                <a:tc>
+                  <a:txBody>
+                    <a:bodyPr/>
+                    <a:lstStyle/>
+                    <a:p>
+                      <a:pPr>
+                        <a:defRPr sz="1050"/>
+                      </a:pPr>
+                      <a:r>
+                        <a:t>tamoxifen</a:t>
+                      </a:r>
+                    </a:p>
+                  </a:txBody>
+                  <a:tcPr/>
+                </a:tc>
+                <a:tc>
+                  <a:txBody>
+                    <a:bodyPr/>
+                    <a:lstStyle/>
+                    <a:p>
+                      <a:pPr>
+                        <a:defRPr sz="1050"/>
+                      </a:pPr>
+                      <a:r>
+                        <a:t>0.9</a:t>
+                      </a:r>
+                    </a:p>
+                  </a:txBody>
+                  <a:tcPr/>
+                </a:tc>
+                <a:tc>
+                  <a:txBody>
+                    <a:bodyPr/>
+                    <a:lstStyle/>
+                    <a:p>
+                      <a:pPr>
+                        <a:defRPr sz="1050"/>
+                      </a:pPr>
+                      <a:r>
+                        <a:t>ER antagonist prodrug; converted to 4-OHT and endoxifen in the liver; competes with estrogen for ER binding, inhibits transcription of estrogen target genes</a:t>
+                      </a:r>
+                    </a:p>
+                  </a:txBody>
+                  <a:tcPr/>
+                </a:tc>
+              </a:tr>
+            </a:tbl>
+          </a:graphicData>
+        </a:graphic>
+      </p:graphicFrame>
+    </p:spTree>
+  </p:cSld>
+  <p:clrMapOvr>
+    <a:masterClrMapping/>
+  </p:clrMapOvr>
+</p:sld>
+</file>
+
+<file path=ppt/slides/slide5.xml><?xml version="1.0" encoding="utf-8"?>
+<p:sld xmlns:a="http://schemas.openxmlformats.org/drawingml/2006/main" xmlns:p="http://schemas.openxmlformats.org/presentationml/2006/main" xmlns:r="http://schemas.openxmlformats.org/officeDocument/2006/relationships">
+  <p:cSld>
+    <p:spTree>
+      <p:nvGrpSpPr>
+        <p:cNvPr id="1" name=""/>
+        <p:cNvGrpSpPr/>
+        <p:nvPr/>
+      </p:nvGrpSpPr>
+      <p:grpSpPr/>
+      <p:sp>
+        <p:nvSpPr>
+          <p:cNvPr id="2" name="TextBox 1"/>
+          <p:cNvSpPr txBox="1"/>
+          <p:nvPr/>
+        </p:nvSpPr>
+        <p:spPr>
+          <a:xfrm>
+            <a:off x="0" y="0"/>
+            <a:ext cx="9144000" cy="685800"/>
+          </a:xfrm>
+          <a:prstGeom prst="rect">
+            <a:avLst/>
+          </a:prstGeom>
+          <a:noFill/>
+        </p:spPr>
+        <p:txBody>
+          <a:bodyPr wrap="none">
+            <a:spAutoFit/>
+          </a:bodyPr>
+          <a:lstStyle/>
+          <a:p/>
+          <a:p>
+            <a:pPr>
+              <a:defRPr sz="2400"/>
+            </a:pPr>
+            <a:r>
+              <a:t>DiSCoVER ∩ CMap: top common drugs (cerebellar stem cell control)</a:t>
+            </a:r>
+          </a:p>
+        </p:txBody>
+      </p:sp>
+      <p:graphicFrame>
+        <p:nvGraphicFramePr>
+          <p:cNvPr id="3" name="Table 2"/>
+          <p:cNvGraphicFramePr>
+            <a:graphicFrameLocks noGrp="1"/>
+          </p:cNvGraphicFramePr>
+          <p:nvPr/>
+        </p:nvGraphicFramePr>
+        <p:xfrm>
+          <a:off x="411480" y="777240"/>
+          <a:ext cx="8503920" cy="4114800"/>
+        </p:xfrm>
+        <a:graphic>
+          <a:graphicData uri="http://schemas.openxmlformats.org/drawingml/2006/table">
+            <a:tbl>
+              <a:tblPr firstRow="1" bandRow="1">
+                <a:tableStyleId>{5C22544A-7EE6-4342-B048-85BDC9FD1C3A}</a:tableStyleId>
+              </a:tblPr>
+              <a:tblGrid>
+                <a:gridCol w="1005840"/>
+                <a:gridCol w="4114800"/>
+                <a:gridCol w="731520"/>
+                <a:gridCol w="1005840"/>
+                <a:gridCol w="914400"/>
+                <a:gridCol w="731520"/>
+              </a:tblGrid>
+              <a:tr h="195942">
+                <a:tc>
+                  <a:txBody>
+                    <a:bodyPr/>
+                    <a:lstStyle/>
+                    <a:p>
+                      <a:pPr>
+                        <a:defRPr sz="1100"/>
+                      </a:pPr>
+                      <a:r>
+                        <a:t>Drug</a:t>
+                      </a:r>
+                    </a:p>
+                  </a:txBody>
+                  <a:tcPr/>
+                </a:tc>
+                <a:tc>
+                  <a:txBody>
+                    <a:bodyPr/>
+                    <a:lstStyle/>
+                    <a:p>
+                      <a:pPr>
+                        <a:defRPr sz="1100"/>
+                      </a:pPr>
+                      <a:r>
+                        <a:t>Mechanism of action</a:t>
+                      </a:r>
+                    </a:p>
+                  </a:txBody>
+                  <a:tcPr/>
+                </a:tc>
+                <a:tc>
+                  <a:txBody>
+                    <a:bodyPr/>
+                    <a:lstStyle/>
+                    <a:p>
+                      <a:pPr>
+                        <a:defRPr sz="1100"/>
+                      </a:pPr>
+                      <a:r>
+                        <a:t>Evidence</a:t>
+                      </a:r>
+                    </a:p>
+                  </a:txBody>
+                  <a:tcPr/>
+                </a:tc>
+                <a:tc>
+                  <a:txBody>
+                    <a:bodyPr/>
+                    <a:lstStyle/>
+                    <a:p>
+                      <a:pPr>
+                        <a:defRPr sz="1100"/>
+                      </a:pPr>
+                      <a:r>
+                        <a:t>DiSCoVER Rank</a:t>
+                      </a:r>
+                    </a:p>
+                  </a:txBody>
+                  <a:tcPr/>
+                </a:tc>
+                <a:tc>
+                  <a:txBody>
+                    <a:bodyPr/>
+                    <a:lstStyle/>
+                    <a:p>
+                      <a:pPr>
+                        <a:defRPr sz="1100"/>
+                      </a:pPr>
+                      <a:r>
+                        <a:t>CMap Rank</a:t>
+                      </a:r>
+                    </a:p>
+                  </a:txBody>
+                  <a:tcPr/>
+                </a:tc>
+                <a:tc>
+                  <a:txBody>
+                    <a:bodyPr/>
+                    <a:lstStyle/>
+                    <a:p>
+                      <a:pPr>
+                        <a:defRPr sz="1100"/>
+                      </a:pPr>
+                      <a:r>
+                        <a:t>Average Rank</a:t>
+                      </a:r>
+                    </a:p>
+                  </a:txBody>
+                  <a:tcPr/>
+                </a:tc>
+              </a:tr>
+              <a:tr h="195942">
+                <a:tc>
+                  <a:txBody>
+                    <a:bodyPr/>
+                    <a:lstStyle/>
+                    <a:p>
+                      <a:pPr>
+                        <a:defRPr sz="1000"/>
+                      </a:pPr>
+                      <a:r>
+                        <a:t>gsk1070916</a:t>
+                      </a:r>
+                    </a:p>
+                  </a:txBody>
+                  <a:tcPr/>
+                </a:tc>
+                <a:tc>
+                  <a:txBody>
+                    <a:bodyPr/>
+                    <a:lstStyle/>
+                    <a:p>
+                      <a:pPr>
+                        <a:defRPr sz="1000"/>
+                      </a:pPr>
+                      <a:r>
+                        <a:t>Not Clinically Relevant</a:t>
+                      </a:r>
+                    </a:p>
+                  </a:txBody>
+                  <a:tcPr/>
+                </a:tc>
+                <a:tc>
+                  <a:txBody>
+                    <a:bodyPr/>
+                    <a:lstStyle/>
+                    <a:p>
+                      <a:pPr>
+                        <a:defRPr sz="1000"/>
+                      </a:pPr>
+                      <a:r>
+                        <a:t>+...</a:t>
+                      </a:r>
+                    </a:p>
+                  </a:txBody>
+                  <a:tcPr/>
+                </a:tc>
+                <a:tc>
+                  <a:txBody>
+                    <a:bodyPr/>
+                    <a:lstStyle/>
+                    <a:p>
+                      <a:pPr>
+                        <a:defRPr sz="1000"/>
+                      </a:pPr>
+                      <a:r>
+                        <a:t>1</a:t>
+                      </a:r>
+                    </a:p>
+                  </a:txBody>
+                  <a:tcPr/>
+                </a:tc>
+                <a:tc>
+                  <a:txBody>
+                    <a:bodyPr/>
+                    <a:lstStyle/>
+                    <a:p>
+                      <a:pPr>
+                        <a:defRPr sz="1000"/>
+                      </a:pPr>
+                      <a:r>
+                        <a:t>175</a:t>
+                      </a:r>
+                    </a:p>
+                  </a:txBody>
+                  <a:tcPr/>
+                </a:tc>
+                <a:tc>
+                  <a:txBody>
+                    <a:bodyPr/>
+                    <a:lstStyle/>
+                    <a:p>
+                      <a:pPr>
+                        <a:defRPr sz="1000"/>
+                      </a:pPr>
+                      <a:r>
+                        <a:t>1.0</a:t>
+                      </a:r>
+                    </a:p>
+                  </a:txBody>
+                  <a:tcPr/>
+                </a:tc>
+              </a:tr>
+              <a:tr h="195942">
+                <a:tc>
+                  <a:txBody>
+                    <a:bodyPr/>
+                    <a:lstStyle/>
+                    <a:p>
+                      <a:pPr>
+                        <a:defRPr sz="1000"/>
+                      </a:pPr>
+                      <a:r>
+                        <a:t>ql-xii-61</a:t>
+                      </a:r>
+                    </a:p>
+                  </a:txBody>
+                  <a:tcPr/>
+                </a:tc>
+                <a:tc>
+                  <a:txBody>
+                    <a:bodyPr/>
+                    <a:lstStyle/>
+                    <a:p>
+                      <a:pPr>
+                        <a:defRPr sz="1000"/>
+                      </a:pPr>
+                      <a:r>
+                        <a:t>Not Clinically Relevant</a:t>
+                      </a:r>
+                    </a:p>
+                  </a:txBody>
+                  <a:tcPr/>
+                </a:tc>
+                <a:tc>
+                  <a:txBody>
+                    <a:bodyPr/>
+                    <a:lstStyle/>
+                    <a:p>
+                      <a:pPr>
+                        <a:defRPr sz="1000"/>
+                      </a:pPr>
+                      <a:r>
+                        <a:t>+...</a:t>
+                      </a:r>
+                    </a:p>
+                  </a:txBody>
+                  <a:tcPr/>
+                </a:tc>
+                <a:tc>
+                  <a:txBody>
+                    <a:bodyPr/>
+                    <a:lstStyle/>
+                    <a:p>
+                      <a:pPr>
+                        <a:defRPr sz="1000"/>
+                      </a:pPr>
+                      <a:r>
+                        <a:t>2</a:t>
+                      </a:r>
+                    </a:p>
+                  </a:txBody>
+                  <a:tcPr/>
+                </a:tc>
+                <a:tc>
+                  <a:txBody>
+                    <a:bodyPr/>
+                    <a:lstStyle/>
+                    <a:p>
+                      <a:pPr>
+                        <a:defRPr sz="1000"/>
+                      </a:pPr>
+                      <a:r>
+                        <a:t>176</a:t>
+                      </a:r>
+                    </a:p>
+                  </a:txBody>
+                  <a:tcPr/>
+                </a:tc>
+                <a:tc>
+                  <a:txBody>
+                    <a:bodyPr/>
+                    <a:lstStyle/>
+                    <a:p>
+                      <a:pPr>
+                        <a:defRPr sz="1000"/>
+                      </a:pPr>
+                      <a:r>
+                        <a:t>2.0</a:t>
+                      </a:r>
+                    </a:p>
+                  </a:txBody>
+                  <a:tcPr/>
+                </a:tc>
+              </a:tr>
+              <a:tr h="195942">
+                <a:tc>
+                  <a:txBody>
+                    <a:bodyPr/>
+                    <a:lstStyle/>
+                    <a:p>
+                      <a:pPr>
+                        <a:defRPr sz="1000"/>
+                      </a:pPr>
+                      <a:r>
+                        <a:t>sb52334</a:t>
+                      </a:r>
+                    </a:p>
+                  </a:txBody>
+                  <a:tcPr/>
+                </a:tc>
+                <a:tc>
+                  <a:txBody>
+                    <a:bodyPr/>
+                    <a:lstStyle/>
+                    <a:p>
+                      <a:pPr>
+                        <a:defRPr sz="1000"/>
+                      </a:pPr>
+                      <a:r>
+                        <a:t>Not Clinically Relevant</a:t>
+                      </a:r>
+                    </a:p>
+                  </a:txBody>
+                  <a:tcPr/>
+                </a:tc>
+                <a:tc>
+                  <a:txBody>
+                    <a:bodyPr/>
+                    <a:lstStyle/>
+                    <a:p>
+                      <a:pPr>
+                        <a:defRPr sz="1000"/>
+                      </a:pPr>
+                      <a:r>
+                        <a:t>+...</a:t>
+                      </a:r>
+                    </a:p>
+                  </a:txBody>
+                  <a:tcPr/>
+                </a:tc>
+                <a:tc>
+                  <a:txBody>
+                    <a:bodyPr/>
+                    <a:lstStyle/>
+                    <a:p>
+                      <a:pPr>
+                        <a:defRPr sz="1000"/>
+                      </a:pPr>
+                      <a:r>
+                        <a:t>3</a:t>
+                      </a:r>
+                    </a:p>
+                  </a:txBody>
+                  <a:tcPr/>
+                </a:tc>
+                <a:tc>
+                  <a:txBody>
+                    <a:bodyPr/>
+                    <a:lstStyle/>
+                    <a:p>
+                      <a:pPr>
+                        <a:defRPr sz="1000"/>
+                      </a:pPr>
+                      <a:r>
+                        <a:t>177</a:t>
+                      </a:r>
+                    </a:p>
+                  </a:txBody>
+                  <a:tcPr/>
+                </a:tc>
+                <a:tc>
+                  <a:txBody>
+                    <a:bodyPr/>
+                    <a:lstStyle/>
+                    <a:p>
+                      <a:pPr>
+                        <a:defRPr sz="1000"/>
+                      </a:pPr>
+                      <a:r>
+                        <a:t>3.0</a:t>
+                      </a:r>
+                    </a:p>
+                  </a:txBody>
+                  <a:tcPr/>
+                </a:tc>
+              </a:tr>
+              <a:tr h="195942">
+                <a:tc>
+                  <a:txBody>
+                    <a:bodyPr/>
+                    <a:lstStyle/>
+                    <a:p>
+                      <a:pPr>
+                        <a:defRPr sz="1000"/>
+                      </a:pPr>
+                      <a:r>
+                        <a:t>thiotepa</a:t>
+                      </a:r>
+                    </a:p>
+                  </a:txBody>
+                  <a:tcPr/>
+                </a:tc>
+                <a:tc>
+                  <a:txBody>
+                    <a:bodyPr/>
+                    <a:lstStyle/>
+                    <a:p>
+                      <a:pPr>
+                        <a:defRPr sz="1000"/>
+                      </a:pPr>
+                      <a:r>
+                        <a:t>alkylating agent, ethylenimine family, causes crosslinks in DNA, which prevents DNA replication and DNA transcription</a:t>
+                      </a:r>
+                    </a:p>
+                  </a:txBody>
+                  <a:tcPr/>
+                </a:tc>
+                <a:tc>
+                  <a:txBody>
+                    <a:bodyPr/>
+                    <a:lstStyle/>
+                    <a:p>
+                      <a:pPr>
+                        <a:defRPr sz="1000"/>
+                      </a:pPr>
+                      <a:r>
+                        <a:t>...+</a:t>
+                      </a:r>
+                    </a:p>
+                  </a:txBody>
+                  <a:tcPr/>
+                </a:tc>
+                <a:tc>
+                  <a:txBody>
+                    <a:bodyPr/>
+                    <a:lstStyle/>
+                    <a:p>
+                      <a:pPr>
+                        <a:defRPr sz="1000"/>
+                      </a:pPr>
+                      <a:r>
+                        <a:t>673</a:t>
+                      </a:r>
+                    </a:p>
+                  </a:txBody>
+                  <a:tcPr/>
+                </a:tc>
+                <a:tc>
+                  <a:txBody>
+                    <a:bodyPr/>
+                    <a:lstStyle/>
+                    <a:p>
+                      <a:pPr>
+                        <a:defRPr sz="1000"/>
+                      </a:pPr>
+                      <a:r>
+                        <a:t>4</a:t>
+                      </a:r>
+                    </a:p>
+                  </a:txBody>
+                  <a:tcPr/>
+                </a:tc>
+                <a:tc>
+                  <a:txBody>
+                    <a:bodyPr/>
+                    <a:lstStyle/>
+                    <a:p>
+                      <a:pPr>
+                        <a:defRPr sz="1000"/>
+                      </a:pPr>
+                      <a:r>
+                        <a:t>4.0</a:t>
+                      </a:r>
+                    </a:p>
+                  </a:txBody>
+                  <a:tcPr/>
+                </a:tc>
+              </a:tr>
+              <a:tr h="195942">
+                <a:tc>
+                  <a:txBody>
+                    <a:bodyPr/>
+                    <a:lstStyle/>
+                    <a:p>
+                      <a:pPr>
+                        <a:defRPr sz="1000"/>
+                      </a:pPr>
+                      <a:r>
+                        <a:t>gsk429286a</a:t>
+                      </a:r>
+                    </a:p>
+                  </a:txBody>
+                  <a:tcPr/>
+                </a:tc>
+                <a:tc>
+                  <a:txBody>
+                    <a:bodyPr/>
+                    <a:lstStyle/>
+                    <a:p>
+                      <a:pPr>
+                        <a:defRPr sz="1000"/>
+                      </a:pPr>
+                      <a:r>
+                        <a:t>Not Clinically Relevant</a:t>
+                      </a:r>
+                    </a:p>
+                  </a:txBody>
+                  <a:tcPr/>
+                </a:tc>
+                <a:tc>
+                  <a:txBody>
+                    <a:bodyPr/>
+                    <a:lstStyle/>
+                    <a:p>
+                      <a:pPr>
+                        <a:defRPr sz="1000"/>
+                      </a:pPr>
+                      <a:r>
+                        <a:t>+...</a:t>
+                      </a:r>
+                    </a:p>
+                  </a:txBody>
+                  <a:tcPr/>
+                </a:tc>
+                <a:tc>
+                  <a:txBody>
+                    <a:bodyPr/>
+                    <a:lstStyle/>
+                    <a:p>
+                      <a:pPr>
+                        <a:defRPr sz="1000"/>
+                      </a:pPr>
+                      <a:r>
+                        <a:t>4</a:t>
+                      </a:r>
+                    </a:p>
+                  </a:txBody>
+                  <a:tcPr/>
+                </a:tc>
+                <a:tc>
+                  <a:txBody>
+                    <a:bodyPr/>
+                    <a:lstStyle/>
+                    <a:p>
+                      <a:pPr>
+                        <a:defRPr sz="1000"/>
+                      </a:pPr>
+                      <a:r>
+                        <a:t>178</a:t>
+                      </a:r>
+                    </a:p>
+                  </a:txBody>
+                  <a:tcPr/>
+                </a:tc>
+                <a:tc>
+                  <a:txBody>
+                    <a:bodyPr/>
+                    <a:lstStyle/>
+                    <a:p>
+                      <a:pPr>
+                        <a:defRPr sz="1000"/>
+                      </a:pPr>
+                      <a:r>
+                        <a:t>4.0</a:t>
+                      </a:r>
+                    </a:p>
+                  </a:txBody>
+                  <a:tcPr/>
+                </a:tc>
+              </a:tr>
+              <a:tr h="195942">
+                <a:tc>
+                  <a:txBody>
+                    <a:bodyPr/>
+                    <a:lstStyle/>
+                    <a:p>
+                      <a:pPr>
+                        <a:defRPr sz="1000"/>
+                      </a:pPr>
+                      <a:r>
+                        <a:t>vx-702</a:t>
+                      </a:r>
+                    </a:p>
+                  </a:txBody>
+                  <a:tcPr/>
+                </a:tc>
+                <a:tc>
+                  <a:txBody>
+                    <a:bodyPr/>
+                    <a:lstStyle/>
+                    <a:p>
+                      <a:pPr>
+                        <a:defRPr sz="1000"/>
+                      </a:pPr>
+                      <a:r>
+                        <a:t>Not Clinically Relevant</a:t>
+                      </a:r>
+                    </a:p>
+                  </a:txBody>
+                  <a:tcPr/>
+                </a:tc>
+                <a:tc>
+                  <a:txBody>
+                    <a:bodyPr/>
+                    <a:lstStyle/>
+                    <a:p>
+                      <a:pPr>
+                        <a:defRPr sz="1000"/>
+                      </a:pPr>
+                      <a:r>
+                        <a:t>+...</a:t>
+                      </a:r>
+                    </a:p>
+                  </a:txBody>
+                  <a:tcPr/>
+                </a:tc>
+                <a:tc>
+                  <a:txBody>
+                    <a:bodyPr/>
+                    <a:lstStyle/>
+                    <a:p>
+                      <a:pPr>
+                        <a:defRPr sz="1000"/>
+                      </a:pPr>
+                      <a:r>
+                        <a:t>5</a:t>
+                      </a:r>
+                    </a:p>
+                  </a:txBody>
+                  <a:tcPr/>
+                </a:tc>
+                <a:tc>
+                  <a:txBody>
+                    <a:bodyPr/>
+                    <a:lstStyle/>
+                    <a:p>
+                      <a:pPr>
+                        <a:defRPr sz="1000"/>
+                      </a:pPr>
+                      <a:r>
+                        <a:t>179</a:t>
+                      </a:r>
+                    </a:p>
+                  </a:txBody>
+                  <a:tcPr/>
+                </a:tc>
+                <a:tc>
+                  <a:txBody>
+                    <a:bodyPr/>
+                    <a:lstStyle/>
+                    <a:p>
+                      <a:pPr>
+                        <a:defRPr sz="1000"/>
+                      </a:pPr>
+                      <a:r>
+                        <a:t>5.0</a:t>
+                      </a:r>
+                    </a:p>
+                  </a:txBody>
+                  <a:tcPr/>
+                </a:tc>
+              </a:tr>
+              <a:tr h="195942">
+                <a:tc>
+                  <a:txBody>
+                    <a:bodyPr/>
+                    <a:lstStyle/>
+                    <a:p>
+                      <a:pPr>
+                        <a:defRPr sz="1000"/>
+                      </a:pPr>
+                      <a:r>
+                        <a:t>raltitrexed</a:t>
+                      </a:r>
+                    </a:p>
+                  </a:txBody>
+                  <a:tcPr/>
+                </a:tc>
+                <a:tc>
+                  <a:txBody>
+                    <a:bodyPr/>
+                    <a:lstStyle/>
+                    <a:p>
+                      <a:pPr>
+                        <a:defRPr sz="1000"/>
+                      </a:pPr>
+                      <a:r>
+                        <a:t>antimetabolite,  inhibitor of thymidylate synthase</a:t>
+                      </a:r>
+                    </a:p>
+                  </a:txBody>
+                  <a:tcPr/>
+                </a:tc>
+                <a:tc>
+                  <a:txBody>
+                    <a:bodyPr/>
+                    <a:lstStyle/>
+                    <a:p>
+                      <a:pPr>
+                        <a:defRPr sz="1000"/>
+                      </a:pPr>
+                      <a:r>
+                        <a:t>...+</a:t>
+                      </a:r>
+                    </a:p>
+                  </a:txBody>
+                  <a:tcPr/>
+                </a:tc>
+                <a:tc>
+                  <a:txBody>
+                    <a:bodyPr/>
+                    <a:lstStyle/>
+                    <a:p>
+                      <a:pPr>
+                        <a:defRPr sz="1000"/>
+                      </a:pPr>
+                      <a:r>
+                        <a:t>676</a:t>
+                      </a:r>
+                    </a:p>
+                  </a:txBody>
+                  <a:tcPr/>
+                </a:tc>
+                <a:tc>
+                  <a:txBody>
+                    <a:bodyPr/>
+                    <a:lstStyle/>
+                    <a:p>
+                      <a:pPr>
+                        <a:defRPr sz="1000"/>
+                      </a:pPr>
+                      <a:r>
+                        <a:t>5</a:t>
+                      </a:r>
+                    </a:p>
+                  </a:txBody>
+                  <a:tcPr/>
+                </a:tc>
+                <a:tc>
+                  <a:txBody>
+                    <a:bodyPr/>
+                    <a:lstStyle/>
+                    <a:p>
+                      <a:pPr>
+                        <a:defRPr sz="1000"/>
+                      </a:pPr>
+                      <a:r>
+                        <a:t>5.0</a:t>
+                      </a:r>
+                    </a:p>
+                  </a:txBody>
+                  <a:tcPr/>
+                </a:tc>
+              </a:tr>
+              <a:tr h="195942">
+                <a:tc>
+                  <a:txBody>
+                    <a:bodyPr/>
+                    <a:lstStyle/>
+                    <a:p>
+                      <a:pPr>
+                        <a:defRPr sz="1000"/>
+                      </a:pPr>
+                      <a:r>
+                        <a:t>escitalopram</a:t>
+                      </a:r>
+                    </a:p>
+                  </a:txBody>
+                  <a:tcPr/>
+                </a:tc>
+                <a:tc>
+                  <a:txBody>
+                    <a:bodyPr/>
+                    <a:lstStyle/>
+                    <a:p>
+                      <a:pPr>
+                        <a:defRPr sz="1000"/>
+                      </a:pPr>
+                      <a:r>
+                        <a:t>Selective Serotonin Reuptake Inhibitor (SSRI)</a:t>
+                      </a:r>
+                    </a:p>
+                  </a:txBody>
+                  <a:tcPr/>
+                </a:tc>
+                <a:tc>
+                  <a:txBody>
+                    <a:bodyPr/>
+                    <a:lstStyle/>
+                    <a:p>
+                      <a:pPr>
+                        <a:defRPr sz="1000"/>
+                      </a:pPr>
+                      <a:r>
+                        <a:t>...+</a:t>
+                      </a:r>
+                    </a:p>
+                  </a:txBody>
+                  <a:tcPr/>
+                </a:tc>
+                <a:tc>
+                  <a:txBody>
+                    <a:bodyPr/>
+                    <a:lstStyle/>
+                    <a:p>
+                      <a:pPr>
+                        <a:defRPr sz="1000"/>
+                      </a:pPr>
+                      <a:r>
+                        <a:t>675</a:t>
+                      </a:r>
+                    </a:p>
+                  </a:txBody>
+                  <a:tcPr/>
+                </a:tc>
+                <a:tc>
+                  <a:txBody>
+                    <a:bodyPr/>
+                    <a:lstStyle/>
+                    <a:p>
+                      <a:pPr>
+                        <a:defRPr sz="1000"/>
+                      </a:pPr>
+                      <a:r>
+                        <a:t>6</a:t>
+                      </a:r>
+                    </a:p>
+                  </a:txBody>
+                  <a:tcPr/>
+                </a:tc>
+                <a:tc>
+                  <a:txBody>
+                    <a:bodyPr/>
+                    <a:lstStyle/>
+                    <a:p>
+                      <a:pPr>
+                        <a:defRPr sz="1000"/>
+                      </a:pPr>
+                      <a:r>
+                        <a:t>6.0</a:t>
+                      </a:r>
+                    </a:p>
+                  </a:txBody>
+                  <a:tcPr/>
+                </a:tc>
+              </a:tr>
+              <a:tr h="195942">
+                <a:tc>
+                  <a:txBody>
+                    <a:bodyPr/>
+                    <a:lstStyle/>
+                    <a:p>
+                      <a:pPr>
+                        <a:defRPr sz="1000"/>
+                      </a:pPr>
+                      <a:r>
+                        <a:t>tl-2-105</a:t>
+                      </a:r>
+                    </a:p>
+                  </a:txBody>
+                  <a:tcPr/>
+                </a:tc>
+                <a:tc>
+                  <a:txBody>
+                    <a:bodyPr/>
+                    <a:lstStyle/>
+                    <a:p>
+                      <a:pPr>
+                        <a:defRPr sz="1000"/>
+                      </a:pPr>
+                      <a:r>
+                        <a:t>Not Clinically Relevant</a:t>
+                      </a:r>
+                    </a:p>
+                  </a:txBody>
+                  <a:tcPr/>
+                </a:tc>
+                <a:tc>
+                  <a:txBody>
+                    <a:bodyPr/>
+                    <a:lstStyle/>
+                    <a:p>
+                      <a:pPr>
+                        <a:defRPr sz="1000"/>
+                      </a:pPr>
+                      <a:r>
+                        <a:t>+...</a:t>
+                      </a:r>
+                    </a:p>
+                  </a:txBody>
+                  <a:tcPr/>
+                </a:tc>
+                <a:tc>
+                  <a:txBody>
+                    <a:bodyPr/>
+                    <a:lstStyle/>
+                    <a:p>
+                      <a:pPr>
+                        <a:defRPr sz="1000"/>
+                      </a:pPr>
+                      <a:r>
+                        <a:t>6</a:t>
+                      </a:r>
+                    </a:p>
+                  </a:txBody>
+                  <a:tcPr/>
+                </a:tc>
+                <a:tc>
+                  <a:txBody>
+                    <a:bodyPr/>
+                    <a:lstStyle/>
+                    <a:p>
+                      <a:pPr>
+                        <a:defRPr sz="1000"/>
+                      </a:pPr>
+                      <a:r>
+                        <a:t>180</a:t>
+                      </a:r>
+                    </a:p>
+                  </a:txBody>
+                  <a:tcPr/>
+                </a:tc>
+                <a:tc>
+                  <a:txBody>
+                    <a:bodyPr/>
+                    <a:lstStyle/>
+                    <a:p>
+                      <a:pPr>
+                        <a:defRPr sz="1000"/>
+                      </a:pPr>
+                      <a:r>
+                        <a:t>6.0</a:t>
+                      </a:r>
+                    </a:p>
+                  </a:txBody>
+                  <a:tcPr/>
+                </a:tc>
+              </a:tr>
+              <a:tr h="195942">
+                <a:tc>
+                  <a:txBody>
+                    <a:bodyPr/>
+                    <a:lstStyle/>
+                    <a:p>
+                      <a:pPr>
+                        <a:defRPr sz="1000"/>
+                      </a:pPr>
+                      <a:r>
+                        <a:t>gw-2580</a:t>
+                      </a:r>
+                    </a:p>
+                  </a:txBody>
+                  <a:tcPr/>
+                </a:tc>
+                <a:tc>
+                  <a:txBody>
+                    <a:bodyPr/>
+                    <a:lstStyle/>
+                    <a:p>
+                      <a:pPr>
+                        <a:defRPr sz="1000"/>
+                      </a:pPr>
+                      <a:r>
+                        <a:t>Not Clinically Relevant</a:t>
+                      </a:r>
+                    </a:p>
+                  </a:txBody>
+                  <a:tcPr/>
+                </a:tc>
+                <a:tc>
+                  <a:txBody>
+                    <a:bodyPr/>
+                    <a:lstStyle/>
+                    <a:p>
+                      <a:pPr>
+                        <a:defRPr sz="1000"/>
+                      </a:pPr>
+                      <a:r>
+                        <a:t>+...</a:t>
+                      </a:r>
+                    </a:p>
+                  </a:txBody>
+                  <a:tcPr/>
+                </a:tc>
+                <a:tc>
+                  <a:txBody>
+                    <a:bodyPr/>
+                    <a:lstStyle/>
+                    <a:p>
+                      <a:pPr>
+                        <a:defRPr sz="1000"/>
+                      </a:pPr>
+                      <a:r>
+                        <a:t>7</a:t>
+                      </a:r>
+                    </a:p>
+                  </a:txBody>
+                  <a:tcPr/>
+                </a:tc>
+                <a:tc>
+                  <a:txBody>
+                    <a:bodyPr/>
+                    <a:lstStyle/>
+                    <a:p>
+                      <a:pPr>
+                        <a:defRPr sz="1000"/>
+                      </a:pPr>
+                      <a:r>
+                        <a:t>181</a:t>
+                      </a:r>
+                    </a:p>
+                  </a:txBody>
+                  <a:tcPr/>
+                </a:tc>
+                <a:tc>
+                  <a:txBody>
+                    <a:bodyPr/>
+                    <a:lstStyle/>
+                    <a:p>
+                      <a:pPr>
+                        <a:defRPr sz="1000"/>
+                      </a:pPr>
+                      <a:r>
+                        <a:t>7.0</a:t>
+                      </a:r>
+                    </a:p>
+                  </a:txBody>
+                  <a:tcPr/>
+                </a:tc>
+              </a:tr>
+              <a:tr h="195942">
+                <a:tc>
+                  <a:txBody>
+                    <a:bodyPr/>
+                    <a:lstStyle/>
+                    <a:p>
+                      <a:pPr>
+                        <a:defRPr sz="1000"/>
+                      </a:pPr>
+                      <a:r>
+                        <a:t>tubastatin a</a:t>
+                      </a:r>
+                    </a:p>
+                  </a:txBody>
+                  <a:tcPr/>
+                </a:tc>
+                <a:tc>
+                  <a:txBody>
+                    <a:bodyPr/>
+                    <a:lstStyle/>
+                    <a:p>
+                      <a:pPr>
+                        <a:defRPr sz="1000"/>
+                      </a:pPr>
+                      <a:r>
+                        <a:t>Not Clinically Relevant</a:t>
+                      </a:r>
+                    </a:p>
+                  </a:txBody>
+                  <a:tcPr/>
+                </a:tc>
+                <a:tc>
+                  <a:txBody>
+                    <a:bodyPr/>
+                    <a:lstStyle/>
+                    <a:p>
+                      <a:pPr>
+                        <a:defRPr sz="1000"/>
+                      </a:pPr>
+                      <a:r>
+                        <a:t>++..</a:t>
+                      </a:r>
+                    </a:p>
+                  </a:txBody>
+                  <a:tcPr/>
+                </a:tc>
+                <a:tc>
+                  <a:txBody>
+                    <a:bodyPr/>
+                    <a:lstStyle/>
+                    <a:p>
+                      <a:pPr>
+                        <a:defRPr sz="1000"/>
+                      </a:pPr>
+                      <a:r>
+                        <a:t>9</a:t>
+                      </a:r>
+                    </a:p>
+                  </a:txBody>
+                  <a:tcPr/>
+                </a:tc>
+                <a:tc>
+                  <a:txBody>
+                    <a:bodyPr/>
+                    <a:lstStyle/>
+                    <a:p>
+                      <a:pPr>
+                        <a:defRPr sz="1000"/>
+                      </a:pPr>
+                      <a:r>
+                        <a:t>182</a:t>
+                      </a:r>
+                    </a:p>
+                  </a:txBody>
+                  <a:tcPr/>
+                </a:tc>
+                <a:tc>
+                  <a:txBody>
+                    <a:bodyPr/>
+                    <a:lstStyle/>
+                    <a:p>
+                      <a:pPr>
+                        <a:defRPr sz="1000"/>
+                      </a:pPr>
+                      <a:r>
+                        <a:t>9.0</a:t>
+                      </a:r>
+                    </a:p>
+                  </a:txBody>
+                  <a:tcPr/>
+                </a:tc>
+              </a:tr>
+              <a:tr h="195942">
+                <a:tc>
+                  <a:txBody>
+                    <a:bodyPr/>
+                    <a:lstStyle/>
+                    <a:p>
+                      <a:pPr>
+                        <a:defRPr sz="1000"/>
+                      </a:pPr>
+                      <a:r>
+                        <a:t>cladribine</a:t>
+                      </a:r>
+                    </a:p>
+                  </a:txBody>
+                  <a:tcPr/>
+                </a:tc>
+                <a:tc>
+                  <a:txBody>
+                    <a:bodyPr/>
+                    <a:lstStyle/>
+                    <a:p>
+                      <a:pPr>
+                        <a:defRPr sz="1000"/>
+                      </a:pPr>
+                      <a:r>
+                        <a:t>purine analog, inhibits adenosine deaminase, which interferes with DNA sythesis. Used for leukemia</a:t>
+                      </a:r>
+                    </a:p>
+                  </a:txBody>
+                  <a:tcPr/>
+                </a:tc>
+                <a:tc>
+                  <a:txBody>
+                    <a:bodyPr/>
+                    <a:lstStyle/>
+                    <a:p>
+                      <a:pPr>
+                        <a:defRPr sz="1000"/>
+                      </a:pPr>
+                      <a:r>
+                        <a:t>...+</a:t>
+                      </a:r>
+                    </a:p>
+                  </a:txBody>
+                  <a:tcPr/>
+                </a:tc>
+                <a:tc>
+                  <a:txBody>
+                    <a:bodyPr/>
+                    <a:lstStyle/>
+                    <a:p>
+                      <a:pPr>
+                        <a:defRPr sz="1000"/>
+                      </a:pPr>
+                      <a:r>
+                        <a:t>677</a:t>
+                      </a:r>
+                    </a:p>
+                  </a:txBody>
+                  <a:tcPr/>
+                </a:tc>
+                <a:tc>
+                  <a:txBody>
+                    <a:bodyPr/>
+                    <a:lstStyle/>
+                    <a:p>
+                      <a:pPr>
+                        <a:defRPr sz="1000"/>
+                      </a:pPr>
+                      <a:r>
+                        <a:t>9</a:t>
+                      </a:r>
+                    </a:p>
+                  </a:txBody>
+                  <a:tcPr/>
+                </a:tc>
+                <a:tc>
+                  <a:txBody>
+                    <a:bodyPr/>
+                    <a:lstStyle/>
+                    <a:p>
+                      <a:pPr>
+                        <a:defRPr sz="1000"/>
+                      </a:pPr>
+                      <a:r>
+                        <a:t>9.0</a:t>
+                      </a:r>
+                    </a:p>
+                  </a:txBody>
+                  <a:tcPr/>
+                </a:tc>
+              </a:tr>
+              <a:tr h="195942">
+                <a:tc>
+                  <a:txBody>
+                    <a:bodyPr/>
+                    <a:lstStyle/>
+                    <a:p>
+                      <a:pPr>
+                        <a:defRPr sz="1000"/>
+                      </a:pPr>
+                      <a:r>
+                        <a:t>gsk-461364</a:t>
+                      </a:r>
+                    </a:p>
+                  </a:txBody>
+                  <a:tcPr/>
+                </a:tc>
+                <a:tc>
+                  <a:txBody>
+                    <a:bodyPr/>
+                    <a:lstStyle/>
+                    <a:p>
+                      <a:pPr>
+                        <a:defRPr sz="1000"/>
+                      </a:pPr>
+                      <a:r>
+                        <a:t>Plk1 inhibitor, less active against Plk2 and Plk3.</a:t>
+                      </a:r>
+                    </a:p>
+                  </a:txBody>
+                  <a:tcPr/>
+                </a:tc>
+                <a:tc>
+                  <a:txBody>
+                    <a:bodyPr/>
+                    <a:lstStyle/>
+                    <a:p>
+                      <a:pPr>
+                        <a:defRPr sz="1000"/>
+                      </a:pPr>
+                      <a:r>
+                        <a:t>...+</a:t>
+                      </a:r>
+                    </a:p>
+                  </a:txBody>
+                  <a:tcPr/>
+                </a:tc>
+                <a:tc>
+                  <a:txBody>
+                    <a:bodyPr/>
+                    <a:lstStyle/>
+                    <a:p>
+                      <a:pPr>
+                        <a:defRPr sz="1000"/>
+                      </a:pPr>
+                      <a:r>
+                        <a:t>678</a:t>
+                      </a:r>
+                    </a:p>
+                  </a:txBody>
+                  <a:tcPr/>
+                </a:tc>
+                <a:tc>
+                  <a:txBody>
+                    <a:bodyPr/>
+                    <a:lstStyle/>
+                    <a:p>
+                      <a:pPr>
+                        <a:defRPr sz="1000"/>
+                      </a:pPr>
+                      <a:r>
+                        <a:t>10</a:t>
+                      </a:r>
+                    </a:p>
+                  </a:txBody>
+                  <a:tcPr/>
+                </a:tc>
+                <a:tc>
+                  <a:txBody>
+                    <a:bodyPr/>
+                    <a:lstStyle/>
+                    <a:p>
+                      <a:pPr>
+                        <a:defRPr sz="1000"/>
+                      </a:pPr>
+                      <a:r>
+                        <a:t>10.0</a:t>
+                      </a:r>
+                    </a:p>
+                  </a:txBody>
+                  <a:tcPr/>
+                </a:tc>
+              </a:tr>
+              <a:tr h="195942">
+                <a:tc>
+                  <a:txBody>
+                    <a:bodyPr/>
+                    <a:lstStyle/>
+                    <a:p>
+                      <a:pPr>
+                        <a:defRPr sz="1000"/>
+                      </a:pPr>
+                      <a:r>
+                        <a:t>bx-912</a:t>
+                      </a:r>
+                    </a:p>
+                  </a:txBody>
+                  <a:tcPr/>
+                </a:tc>
+                <a:tc>
+                  <a:txBody>
+                    <a:bodyPr/>
+                    <a:lstStyle/>
+                    <a:p>
+                      <a:pPr>
+                        <a:defRPr sz="1000"/>
+                      </a:pPr>
+                      <a:r>
+                        <a:t>Not Clinically Relevant</a:t>
+                      </a:r>
+                    </a:p>
+                  </a:txBody>
+                  <a:tcPr/>
+                </a:tc>
+                <a:tc>
+                  <a:txBody>
+                    <a:bodyPr/>
+                    <a:lstStyle/>
+                    <a:p>
+                      <a:pPr>
+                        <a:defRPr sz="1000"/>
+                      </a:pPr>
+                      <a:r>
+                        <a:t>+...</a:t>
+                      </a:r>
+                    </a:p>
+                  </a:txBody>
+                  <a:tcPr/>
+                </a:tc>
+                <a:tc>
+                  <a:txBody>
+                    <a:bodyPr/>
+                    <a:lstStyle/>
+                    <a:p>
+                      <a:pPr>
+                        <a:defRPr sz="1000"/>
+                      </a:pPr>
+                      <a:r>
+                        <a:t>10</a:t>
+                      </a:r>
+                    </a:p>
+                  </a:txBody>
+                  <a:tcPr/>
+                </a:tc>
+                <a:tc>
+                  <a:txBody>
+                    <a:bodyPr/>
+                    <a:lstStyle/>
+                    <a:p>
+                      <a:pPr>
+                        <a:defRPr sz="1000"/>
+                      </a:pPr>
+                      <a:r>
+                        <a:t>183</a:t>
+                      </a:r>
+                    </a:p>
+                  </a:txBody>
+                  <a:tcPr/>
+                </a:tc>
+                <a:tc>
+                  <a:txBody>
+                    <a:bodyPr/>
+                    <a:lstStyle/>
+                    <a:p>
+                      <a:pPr>
+                        <a:defRPr sz="1000"/>
+                      </a:pPr>
+                      <a:r>
+                        <a:t>10.0</a:t>
+                      </a:r>
+                    </a:p>
+                  </a:txBody>
+                  <a:tcPr/>
+                </a:tc>
+              </a:tr>
+              <a:tr h="195942">
+                <a:tc>
+                  <a:txBody>
+                    <a:bodyPr/>
+                    <a:lstStyle/>
+                    <a:p>
+                      <a:pPr>
+                        <a:defRPr sz="1000"/>
+                      </a:pPr>
+                      <a:r>
+                        <a:t>formestane</a:t>
+                      </a:r>
+                    </a:p>
+                  </a:txBody>
+                  <a:tcPr/>
+                </a:tc>
+                <a:tc>
+                  <a:txBody>
+                    <a:bodyPr/>
+                    <a:lstStyle/>
+                    <a:p>
+                      <a:pPr>
+                        <a:defRPr sz="1000"/>
+                      </a:pPr>
+                      <a:r>
+                        <a:t>steroidal, selective aromatase inhibitor, used for ER+ Breast cancer</a:t>
+                      </a:r>
+                    </a:p>
+                  </a:txBody>
+                  <a:tcPr/>
+                </a:tc>
+                <a:tc>
+                  <a:txBody>
+                    <a:bodyPr/>
+                    <a:lstStyle/>
+                    <a:p>
+                      <a:pPr>
+                        <a:defRPr sz="1000"/>
+                      </a:pPr>
+                      <a:r>
+                        <a:t>...+</a:t>
+                      </a:r>
+                    </a:p>
+                  </a:txBody>
+                  <a:tcPr/>
+                </a:tc>
+                <a:tc>
+                  <a:txBody>
+                    <a:bodyPr/>
+                    <a:lstStyle/>
+                    <a:p>
+                      <a:pPr>
+                        <a:defRPr sz="1000"/>
+                      </a:pPr>
+                      <a:r>
+                        <a:t>679</a:t>
+                      </a:r>
+                    </a:p>
+                  </a:txBody>
+                  <a:tcPr/>
+                </a:tc>
+                <a:tc>
+                  <a:txBody>
+                    <a:bodyPr/>
+                    <a:lstStyle/>
+                    <a:p>
+                      <a:pPr>
+                        <a:defRPr sz="1000"/>
+                      </a:pPr>
+                      <a:r>
+                        <a:t>11</a:t>
+                      </a:r>
+                    </a:p>
+                  </a:txBody>
+                  <a:tcPr/>
+                </a:tc>
+                <a:tc>
+                  <a:txBody>
+                    <a:bodyPr/>
+                    <a:lstStyle/>
+                    <a:p>
+                      <a:pPr>
+                        <a:defRPr sz="1000"/>
+                      </a:pPr>
+                      <a:r>
+                        <a:t>11.0</a:t>
+                      </a:r>
+                    </a:p>
+                  </a:txBody>
+                  <a:tcPr/>
+                </a:tc>
+              </a:tr>
+              <a:tr h="195942">
+                <a:tc>
+                  <a:txBody>
+                    <a:bodyPr/>
+                    <a:lstStyle/>
+                    <a:p>
+                      <a:pPr>
+                        <a:defRPr sz="1000"/>
+                      </a:pPr>
+                      <a:r>
+                        <a:t>rucaparib</a:t>
+                      </a:r>
+                    </a:p>
+                  </a:txBody>
+                  <a:tcPr/>
+                </a:tc>
+                <a:tc>
+                  <a:txBody>
+                    <a:bodyPr/>
+                    <a:lstStyle/>
+                    <a:p>
+                      <a:pPr>
+                        <a:defRPr sz="1000"/>
+                      </a:pPr>
+                      <a:r>
+                        <a:t>PARP inhibitor, inhibits DNA repair</a:t>
+                      </a:r>
+                    </a:p>
+                  </a:txBody>
+                  <a:tcPr/>
+                </a:tc>
+                <a:tc>
+                  <a:txBody>
+                    <a:bodyPr/>
+                    <a:lstStyle/>
+                    <a:p>
+                      <a:pPr>
+                        <a:defRPr sz="1000"/>
+                      </a:pPr>
+                      <a:r>
+                        <a:t>+..+</a:t>
+                      </a:r>
+                    </a:p>
+                  </a:txBody>
+                  <a:tcPr/>
+                </a:tc>
+                <a:tc>
+                  <a:txBody>
+                    <a:bodyPr/>
+                    <a:lstStyle/>
+                    <a:p>
+                      <a:pPr>
+                        <a:defRPr sz="1000"/>
+                      </a:pPr>
+                      <a:r>
+                        <a:t>15</a:t>
+                      </a:r>
+                    </a:p>
+                  </a:txBody>
+                  <a:tcPr/>
+                </a:tc>
+                <a:tc>
+                  <a:txBody>
+                    <a:bodyPr/>
+                    <a:lstStyle/>
+                    <a:p>
+                      <a:pPr>
+                        <a:defRPr sz="1000"/>
+                      </a:pPr>
+                      <a:r>
+                        <a:t>7</a:t>
+                      </a:r>
+                    </a:p>
+                  </a:txBody>
+                  <a:tcPr/>
+                </a:tc>
+                <a:tc>
+                  <a:txBody>
+                    <a:bodyPr/>
+                    <a:lstStyle/>
+                    <a:p>
+                      <a:pPr>
+                        <a:defRPr sz="1000"/>
+                      </a:pPr>
+                      <a:r>
+                        <a:t>11.0</a:t>
+                      </a:r>
+                    </a:p>
+                  </a:txBody>
+                  <a:tcPr/>
+                </a:tc>
+              </a:tr>
+              <a:tr h="195942">
+                <a:tc>
+                  <a:txBody>
+                    <a:bodyPr/>
+                    <a:lstStyle/>
+                    <a:p>
+                      <a:pPr>
+                        <a:defRPr sz="1000"/>
+                      </a:pPr>
+                      <a:r>
+                        <a:t>cs-1657</a:t>
+                      </a:r>
+                    </a:p>
+                  </a:txBody>
+                  <a:tcPr/>
+                </a:tc>
+                <a:tc>
+                  <a:txBody>
+                    <a:bodyPr/>
+                    <a:lstStyle/>
+                    <a:p>
+                      <a:pPr>
+                        <a:defRPr sz="1000"/>
+                      </a:pPr>
+                      <a:r>
+                        <a:t>Ixazomib, Proteasome inhibitor, inhibits the chymotrypsin-like proteolytic (β5) site of the 20S proteasome </a:t>
+                      </a:r>
+                    </a:p>
+                  </a:txBody>
+                  <a:tcPr/>
+                </a:tc>
+                <a:tc>
+                  <a:txBody>
+                    <a:bodyPr/>
+                    <a:lstStyle/>
+                    <a:p>
+                      <a:pPr>
+                        <a:defRPr sz="1000"/>
+                      </a:pPr>
+                      <a:r>
+                        <a:t>...+</a:t>
+                      </a:r>
+                    </a:p>
+                  </a:txBody>
+                  <a:tcPr/>
+                </a:tc>
+                <a:tc>
+                  <a:txBody>
+                    <a:bodyPr/>
+                    <a:lstStyle/>
+                    <a:p>
+                      <a:pPr>
+                        <a:defRPr sz="1000"/>
+                      </a:pPr>
+                      <a:r>
+                        <a:t>680</a:t>
+                      </a:r>
+                    </a:p>
+                  </a:txBody>
+                  <a:tcPr/>
+                </a:tc>
+                <a:tc>
+                  <a:txBody>
+                    <a:bodyPr/>
+                    <a:lstStyle/>
+                    <a:p>
+                      <a:pPr>
+                        <a:defRPr sz="1000"/>
+                      </a:pPr>
+                      <a:r>
+                        <a:t>14</a:t>
+                      </a:r>
+                    </a:p>
+                  </a:txBody>
+                  <a:tcPr/>
+                </a:tc>
+                <a:tc>
+                  <a:txBody>
+                    <a:bodyPr/>
+                    <a:lstStyle/>
+                    <a:p>
+                      <a:pPr>
+                        <a:defRPr sz="1000"/>
+                      </a:pPr>
+                      <a:r>
+                        <a:t>14.0</a:t>
+                      </a:r>
+                    </a:p>
+                  </a:txBody>
+                  <a:tcPr/>
+                </a:tc>
+              </a:tr>
+              <a:tr h="195942">
+                <a:tc>
+                  <a:txBody>
+                    <a:bodyPr/>
+                    <a:lstStyle/>
+                    <a:p>
+                      <a:pPr>
+                        <a:defRPr sz="1000"/>
+                      </a:pPr>
+                      <a:r>
+                        <a:t>amuvatinib</a:t>
+                      </a:r>
+                    </a:p>
+                  </a:txBody>
+                  <a:tcPr/>
+                </a:tc>
+                <a:tc>
+                  <a:txBody>
+                    <a:bodyPr/>
+                    <a:lstStyle/>
+                    <a:p>
+                      <a:pPr>
+                        <a:defRPr sz="1000"/>
+                      </a:pPr>
+                      <a:r>
+                        <a:t>Not Clinically Relevant</a:t>
+                      </a:r>
+                    </a:p>
+                  </a:txBody>
+                  <a:tcPr/>
+                </a:tc>
+                <a:tc>
+                  <a:txBody>
+                    <a:bodyPr/>
+                    <a:lstStyle/>
+                    <a:p>
+                      <a:pPr>
+                        <a:defRPr sz="1000"/>
+                      </a:pPr>
+                      <a:r>
+                        <a:t>+...</a:t>
+                      </a:r>
+                    </a:p>
+                  </a:txBody>
+                  <a:tcPr/>
+                </a:tc>
+                <a:tc>
+                  <a:txBody>
+                    <a:bodyPr/>
+                    <a:lstStyle/>
+                    <a:p>
+                      <a:pPr>
+                        <a:defRPr sz="1000"/>
+                      </a:pPr>
+                      <a:r>
+                        <a:t>14</a:t>
+                      </a:r>
+                    </a:p>
+                  </a:txBody>
+                  <a:tcPr/>
+                </a:tc>
+                <a:tc>
+                  <a:txBody>
+                    <a:bodyPr/>
+                    <a:lstStyle/>
+                    <a:p>
+                      <a:pPr>
+                        <a:defRPr sz="1000"/>
+                      </a:pPr>
+                      <a:r>
+                        <a:t>184</a:t>
+                      </a:r>
+                    </a:p>
+                  </a:txBody>
+                  <a:tcPr/>
+                </a:tc>
+                <a:tc>
+                  <a:txBody>
+                    <a:bodyPr/>
+                    <a:lstStyle/>
+                    <a:p>
+                      <a:pPr>
+                        <a:defRPr sz="1000"/>
+                      </a:pPr>
+                      <a:r>
+                        <a:t>14.0</a:t>
+                      </a:r>
+                    </a:p>
+                  </a:txBody>
+                  <a:tcPr/>
+                </a:tc>
+              </a:tr>
+              <a:tr h="195942">
+                <a:tc>
+                  <a:txBody>
+                    <a:bodyPr/>
+                    <a:lstStyle/>
+                    <a:p>
+                      <a:pPr>
+                        <a:defRPr sz="1000"/>
+                      </a:pPr>
+                      <a:r>
+                        <a:t>goserelin</a:t>
+                      </a:r>
+                    </a:p>
+                  </a:txBody>
+                  <a:tcPr/>
+                </a:tc>
+                <a:tc>
+                  <a:txBody>
+                    <a:bodyPr/>
+                    <a:lstStyle/>
+                    <a:p>
+                      <a:pPr>
+                        <a:defRPr sz="1000"/>
+                      </a:pPr>
+                      <a:r>
+                        <a:t>decapeptide, synthetic analog of LHRH, suppresses production of testosterone and estrogen</a:t>
+                      </a:r>
+                    </a:p>
+                  </a:txBody>
+                  <a:tcPr/>
+                </a:tc>
+                <a:tc>
+                  <a:txBody>
+                    <a:bodyPr/>
+                    <a:lstStyle/>
+                    <a:p>
+                      <a:pPr>
+                        <a:defRPr sz="1000"/>
+                      </a:pPr>
+                      <a:r>
+                        <a:t>...+</a:t>
+                      </a:r>
+                    </a:p>
+                  </a:txBody>
+                  <a:tcPr/>
+                </a:tc>
+                <a:tc>
+                  <a:txBody>
+                    <a:bodyPr/>
+                    <a:lstStyle/>
+                    <a:p>
+                      <a:pPr>
+                        <a:defRPr sz="1000"/>
+                      </a:pPr>
+                      <a:r>
+                        <a:t>682</a:t>
+                      </a:r>
+                    </a:p>
+                  </a:txBody>
+                  <a:tcPr/>
+                </a:tc>
+                <a:tc>
+                  <a:txBody>
+                    <a:bodyPr/>
+                    <a:lstStyle/>
+                    <a:p>
+                      <a:pPr>
+                        <a:defRPr sz="1000"/>
+                      </a:pPr>
+                      <a:r>
+                        <a:t>15</a:t>
+                      </a:r>
+                    </a:p>
+                  </a:txBody>
+                  <a:tcPr/>
+                </a:tc>
+                <a:tc>
+                  <a:txBody>
+                    <a:bodyPr/>
+                    <a:lstStyle/>
+                    <a:p>
+                      <a:pPr>
+                        <a:defRPr sz="1000"/>
+                      </a:pPr>
+                      <a:r>
+                        <a:t>15.0</a:t>
+                      </a:r>
+                    </a:p>
+                  </a:txBody>
+                  <a:tcPr/>
+                </a:tc>
+              </a:tr>
+              <a:tr h="195960">
+                <a:tc>
+                  <a:txBody>
+                    <a:bodyPr/>
+                    <a:lstStyle/>
+                    <a:p>
+                      <a:pPr>
+                        <a:defRPr sz="1000"/>
+                      </a:pPr>
+                      <a:r>
+                        <a:t>on-01910</a:t>
+                      </a:r>
+                    </a:p>
+                  </a:txBody>
+                  <a:tcPr/>
+                </a:tc>
+                <a:tc>
+                  <a:txBody>
+                    <a:bodyPr/>
+                    <a:lstStyle/>
+                    <a:p>
+                      <a:pPr>
+                        <a:defRPr sz="1000"/>
+                      </a:pPr>
+                      <a:r>
+                        <a:t>ON-01910, Plk-1 inhibitor</a:t>
+                      </a:r>
+                    </a:p>
+                  </a:txBody>
+                  <a:tcPr/>
+                </a:tc>
+                <a:tc>
+                  <a:txBody>
+                    <a:bodyPr/>
+                    <a:lstStyle/>
+                    <a:p>
+                      <a:pPr>
+                        <a:defRPr sz="1000"/>
+                      </a:pPr>
+                      <a:r>
+                        <a:t>...+</a:t>
+                      </a:r>
+                    </a:p>
+                  </a:txBody>
+                  <a:tcPr/>
+                </a:tc>
+                <a:tc>
+                  <a:txBody>
+                    <a:bodyPr/>
+                    <a:lstStyle/>
+                    <a:p>
+                      <a:pPr>
+                        <a:defRPr sz="1000"/>
+                      </a:pPr>
+                      <a:r>
+                        <a:t>683</a:t>
+                      </a:r>
+                    </a:p>
+                  </a:txBody>
+                  <a:tcPr/>
+                </a:tc>
+                <a:tc>
+                  <a:txBody>
+                    <a:bodyPr/>
+                    <a:lstStyle/>
+                    <a:p>
+                      <a:pPr>
+                        <a:defRPr sz="1000"/>
+                      </a:pPr>
+                      <a:r>
+                        <a:t>16</a:t>
+                      </a:r>
+                    </a:p>
+                  </a:txBody>
+                  <a:tcPr/>
+                </a:tc>
+                <a:tc>
+                  <a:txBody>
+                    <a:bodyPr/>
+                    <a:lstStyle/>
+                    <a:p>
+                      <a:pPr>
+                        <a:defRPr sz="1000"/>
+                      </a:pPr>
+                      <a:r>
+                        <a:t>16.0</a:t>
                       </a:r>
                     </a:p>
                   </a:txBody>

</xml_diff>